<commit_message>
Test 351 almost done
</commit_message>
<xml_diff>
--- a/web/media/ppt/timelineQRCode.pptx
+++ b/web/media/ppt/timelineQRCode.pptx
@@ -5,15 +5,16 @@
     <p:sldMasterId id="2147483648" r:id="rId1"/>
   </p:sldMasterIdLst>
   <p:sldIdLst>
-    <p:sldId id="256" r:id="rId2"/>
-    <p:sldId id="257" r:id="rId3"/>
-    <p:sldId id="266" r:id="rId4"/>
-    <p:sldId id="267" r:id="rId5"/>
-    <p:sldId id="271" r:id="rId6"/>
-    <p:sldId id="270" r:id="rId7"/>
-    <p:sldId id="273" r:id="rId8"/>
-    <p:sldId id="272" r:id="rId9"/>
-    <p:sldId id="269" r:id="rId10"/>
+    <p:sldId id="274" r:id="rId2"/>
+    <p:sldId id="256" r:id="rId3"/>
+    <p:sldId id="257" r:id="rId4"/>
+    <p:sldId id="266" r:id="rId5"/>
+    <p:sldId id="267" r:id="rId6"/>
+    <p:sldId id="271" r:id="rId7"/>
+    <p:sldId id="270" r:id="rId8"/>
+    <p:sldId id="273" r:id="rId9"/>
+    <p:sldId id="272" r:id="rId10"/>
+    <p:sldId id="269" r:id="rId11"/>
   </p:sldIdLst>
   <p:sldSz cx="12192000" cy="6858000"/>
   <p:notesSz cx="6858000" cy="9144000"/>
@@ -271,7 +272,7 @@
           <a:p>
             <a:fld id="{3ABE52FA-3C23-44BD-B501-603726A78153}" type="datetimeFigureOut">
               <a:rPr lang="en-US" smtClean="0"/>
-              <a:t>04-02-18</a:t>
+              <a:t>15-02-18</a:t>
             </a:fld>
             <a:endParaRPr lang="en-US"/>
           </a:p>
@@ -469,7 +470,7 @@
           <a:p>
             <a:fld id="{3ABE52FA-3C23-44BD-B501-603726A78153}" type="datetimeFigureOut">
               <a:rPr lang="en-US" smtClean="0"/>
-              <a:t>04-02-18</a:t>
+              <a:t>15-02-18</a:t>
             </a:fld>
             <a:endParaRPr lang="en-US"/>
           </a:p>
@@ -677,7 +678,7 @@
           <a:p>
             <a:fld id="{3ABE52FA-3C23-44BD-B501-603726A78153}" type="datetimeFigureOut">
               <a:rPr lang="en-US" smtClean="0"/>
-              <a:t>04-02-18</a:t>
+              <a:t>15-02-18</a:t>
             </a:fld>
             <a:endParaRPr lang="en-US"/>
           </a:p>
@@ -875,7 +876,7 @@
           <a:p>
             <a:fld id="{3ABE52FA-3C23-44BD-B501-603726A78153}" type="datetimeFigureOut">
               <a:rPr lang="en-US" smtClean="0"/>
-              <a:t>04-02-18</a:t>
+              <a:t>15-02-18</a:t>
             </a:fld>
             <a:endParaRPr lang="en-US"/>
           </a:p>
@@ -1150,7 +1151,7 @@
           <a:p>
             <a:fld id="{3ABE52FA-3C23-44BD-B501-603726A78153}" type="datetimeFigureOut">
               <a:rPr lang="en-US" smtClean="0"/>
-              <a:t>04-02-18</a:t>
+              <a:t>15-02-18</a:t>
             </a:fld>
             <a:endParaRPr lang="en-US"/>
           </a:p>
@@ -1415,7 +1416,7 @@
           <a:p>
             <a:fld id="{3ABE52FA-3C23-44BD-B501-603726A78153}" type="datetimeFigureOut">
               <a:rPr lang="en-US" smtClean="0"/>
-              <a:t>04-02-18</a:t>
+              <a:t>15-02-18</a:t>
             </a:fld>
             <a:endParaRPr lang="en-US"/>
           </a:p>
@@ -1827,7 +1828,7 @@
           <a:p>
             <a:fld id="{3ABE52FA-3C23-44BD-B501-603726A78153}" type="datetimeFigureOut">
               <a:rPr lang="en-US" smtClean="0"/>
-              <a:t>04-02-18</a:t>
+              <a:t>15-02-18</a:t>
             </a:fld>
             <a:endParaRPr lang="en-US"/>
           </a:p>
@@ -1968,7 +1969,7 @@
           <a:p>
             <a:fld id="{3ABE52FA-3C23-44BD-B501-603726A78153}" type="datetimeFigureOut">
               <a:rPr lang="en-US" smtClean="0"/>
-              <a:t>04-02-18</a:t>
+              <a:t>15-02-18</a:t>
             </a:fld>
             <a:endParaRPr lang="en-US"/>
           </a:p>
@@ -2081,7 +2082,7 @@
           <a:p>
             <a:fld id="{3ABE52FA-3C23-44BD-B501-603726A78153}" type="datetimeFigureOut">
               <a:rPr lang="en-US" smtClean="0"/>
-              <a:t>04-02-18</a:t>
+              <a:t>15-02-18</a:t>
             </a:fld>
             <a:endParaRPr lang="en-US"/>
           </a:p>
@@ -2392,7 +2393,7 @@
           <a:p>
             <a:fld id="{3ABE52FA-3C23-44BD-B501-603726A78153}" type="datetimeFigureOut">
               <a:rPr lang="en-US" smtClean="0"/>
-              <a:t>04-02-18</a:t>
+              <a:t>15-02-18</a:t>
             </a:fld>
             <a:endParaRPr lang="en-US"/>
           </a:p>
@@ -2680,7 +2681,7 @@
           <a:p>
             <a:fld id="{3ABE52FA-3C23-44BD-B501-603726A78153}" type="datetimeFigureOut">
               <a:rPr lang="en-US" smtClean="0"/>
-              <a:t>04-02-18</a:t>
+              <a:t>15-02-18</a:t>
             </a:fld>
             <a:endParaRPr lang="en-US"/>
           </a:p>
@@ -2921,7 +2922,7 @@
           <a:p>
             <a:fld id="{3ABE52FA-3C23-44BD-B501-603726A78153}" type="datetimeFigureOut">
               <a:rPr lang="en-US" smtClean="0"/>
-              <a:t>04-02-18</a:t>
+              <a:t>15-02-18</a:t>
             </a:fld>
             <a:endParaRPr lang="en-US"/>
           </a:p>
@@ -3338,38 +3339,132 @@
           <a:chExt cx="0" cy="0"/>
         </a:xfrm>
       </p:grpSpPr>
-      <p:sp>
-        <p:nvSpPr>
-          <p:cNvPr id="2" name="Title 1">
-            <a:extLst>
-              <a:ext uri="{FF2B5EF4-FFF2-40B4-BE49-F238E27FC236}">
-                <a16:creationId xmlns:a16="http://schemas.microsoft.com/office/drawing/2014/main" id="{C62CCACC-38A5-407B-A5F6-0C6438ECF71D}"/>
-              </a:ext>
-            </a:extLst>
-          </p:cNvPr>
-          <p:cNvSpPr>
-            <a:spLocks noGrp="1"/>
-          </p:cNvSpPr>
-          <p:nvPr>
-            <p:ph type="ctrTitle"/>
-          </p:nvPr>
-        </p:nvSpPr>
+      <p:pic>
+        <p:nvPicPr>
+          <p:cNvPr id="2" name="Picture 1">
+            <a:extLst>
+              <a:ext uri="{FF2B5EF4-FFF2-40B4-BE49-F238E27FC236}">
+                <a16:creationId xmlns:a16="http://schemas.microsoft.com/office/drawing/2014/main" id="{A0B24292-044A-4C96-AEDD-09729CE0E720}"/>
+              </a:ext>
+            </a:extLst>
+          </p:cNvPr>
+          <p:cNvPicPr>
+            <a:picLocks noChangeAspect="1"/>
+          </p:cNvPicPr>
+          <p:nvPr/>
+        </p:nvPicPr>
+        <p:blipFill>
+          <a:blip r:embed="rId2"/>
+          <a:stretch>
+            <a:fillRect/>
+          </a:stretch>
+        </p:blipFill>
         <p:spPr>
           <a:xfrm>
-            <a:off x="1524000" y="1122362"/>
-            <a:ext cx="9144000" cy="4481483"/>
+            <a:off x="4706223" y="2202024"/>
+            <a:ext cx="2664961" cy="2528187"/>
           </a:xfrm>
+          <a:prstGeom prst="rect">
+            <a:avLst/>
+          </a:prstGeom>
         </p:spPr>
-        <p:txBody>
-          <a:bodyPr>
-            <a:normAutofit/>
-          </a:bodyPr>
-          <a:lstStyle/>
-          <a:p>
-            <a:endParaRPr lang="en-US" dirty="0"/>
-          </a:p>
-        </p:txBody>
-      </p:sp>
+      </p:pic>
+    </p:spTree>
+    <p:extLst>
+      <p:ext uri="{BB962C8B-B14F-4D97-AF65-F5344CB8AC3E}">
+        <p14:creationId xmlns:p14="http://schemas.microsoft.com/office/powerpoint/2010/main" val="2842383596"/>
+      </p:ext>
+    </p:extLst>
+  </p:cSld>
+  <p:clrMapOvr>
+    <a:masterClrMapping/>
+  </p:clrMapOvr>
+</p:sld>
+</file>
+
+<file path=ppt/slides/slide10.xml><?xml version="1.0" encoding="utf-8"?>
+<p:sld xmlns:a="http://schemas.openxmlformats.org/drawingml/2006/main" xmlns:r="http://schemas.openxmlformats.org/officeDocument/2006/relationships" xmlns:p="http://schemas.openxmlformats.org/presentationml/2006/main">
+  <p:cSld>
+    <p:spTree>
+      <p:nvGrpSpPr>
+        <p:cNvPr id="1" name=""/>
+        <p:cNvGrpSpPr/>
+        <p:nvPr/>
+      </p:nvGrpSpPr>
+      <p:grpSpPr>
+        <a:xfrm>
+          <a:off x="0" y="0"/>
+          <a:ext cx="0" cy="0"/>
+          <a:chOff x="0" y="0"/>
+          <a:chExt cx="0" cy="0"/>
+        </a:xfrm>
+      </p:grpSpPr>
+      <p:pic>
+        <p:nvPicPr>
+          <p:cNvPr id="6" name="Picture 5">
+            <a:extLst>
+              <a:ext uri="{FF2B5EF4-FFF2-40B4-BE49-F238E27FC236}">
+                <a16:creationId xmlns:a16="http://schemas.microsoft.com/office/drawing/2014/main" id="{B5A34B44-DFC3-4E59-9F30-88F3394A6D5D}"/>
+              </a:ext>
+            </a:extLst>
+          </p:cNvPr>
+          <p:cNvPicPr>
+            <a:picLocks noChangeAspect="1"/>
+          </p:cNvPicPr>
+          <p:nvPr/>
+        </p:nvPicPr>
+        <p:blipFill>
+          <a:blip r:embed="rId2">
+            <a:extLst>
+              <a:ext uri="{28A0092B-C50C-407E-A947-70E740481C1C}">
+                <a14:useLocalDpi xmlns:a14="http://schemas.microsoft.com/office/drawing/2010/main" val="0"/>
+              </a:ext>
+            </a:extLst>
+          </a:blip>
+          <a:stretch>
+            <a:fillRect/>
+          </a:stretch>
+        </p:blipFill>
+        <p:spPr>
+          <a:xfrm>
+            <a:off x="4236099" y="1482455"/>
+            <a:ext cx="3526971" cy="3526971"/>
+          </a:xfrm>
+          <a:prstGeom prst="rect">
+            <a:avLst/>
+          </a:prstGeom>
+        </p:spPr>
+      </p:pic>
+    </p:spTree>
+    <p:extLst>
+      <p:ext uri="{BB962C8B-B14F-4D97-AF65-F5344CB8AC3E}">
+        <p14:creationId xmlns:p14="http://schemas.microsoft.com/office/powerpoint/2010/main" val="2150512204"/>
+      </p:ext>
+    </p:extLst>
+  </p:cSld>
+  <p:clrMapOvr>
+    <a:masterClrMapping/>
+  </p:clrMapOvr>
+</p:sld>
+</file>
+
+<file path=ppt/slides/slide2.xml><?xml version="1.0" encoding="utf-8"?>
+<p:sld xmlns:a="http://schemas.openxmlformats.org/drawingml/2006/main" xmlns:r="http://schemas.openxmlformats.org/officeDocument/2006/relationships" xmlns:p="http://schemas.openxmlformats.org/presentationml/2006/main">
+  <p:cSld>
+    <p:spTree>
+      <p:nvGrpSpPr>
+        <p:cNvPr id="1" name=""/>
+        <p:cNvGrpSpPr/>
+        <p:nvPr/>
+      </p:nvGrpSpPr>
+      <p:grpSpPr>
+        <a:xfrm>
+          <a:off x="0" y="0"/>
+          <a:ext cx="0" cy="0"/>
+          <a:chOff x="0" y="0"/>
+          <a:chExt cx="0" cy="0"/>
+        </a:xfrm>
+      </p:grpSpPr>
       <p:pic>
         <p:nvPicPr>
           <p:cNvPr id="4" name="Picture 3">
@@ -3419,7 +3514,7 @@
 </p:sld>
 </file>
 
-<file path=ppt/slides/slide2.xml><?xml version="1.0" encoding="utf-8"?>
+<file path=ppt/slides/slide3.xml><?xml version="1.0" encoding="utf-8"?>
 <p:sld xmlns:a="http://schemas.openxmlformats.org/drawingml/2006/main" xmlns:r="http://schemas.openxmlformats.org/officeDocument/2006/relationships" xmlns:p="http://schemas.openxmlformats.org/presentationml/2006/main">
   <p:cSld>
     <p:spTree>
@@ -3517,7 +3612,7 @@
 </p:sld>
 </file>
 
-<file path=ppt/slides/slide3.xml><?xml version="1.0" encoding="utf-8"?>
+<file path=ppt/slides/slide4.xml><?xml version="1.0" encoding="utf-8"?>
 <p:sld xmlns:a="http://schemas.openxmlformats.org/drawingml/2006/main" xmlns:r="http://schemas.openxmlformats.org/officeDocument/2006/relationships" xmlns:p="http://schemas.openxmlformats.org/presentationml/2006/main">
   <p:cSld>
     <p:spTree>
@@ -3615,7 +3710,7 @@
 </p:sld>
 </file>
 
-<file path=ppt/slides/slide4.xml><?xml version="1.0" encoding="utf-8"?>
+<file path=ppt/slides/slide5.xml><?xml version="1.0" encoding="utf-8"?>
 <p:sld xmlns:a="http://schemas.openxmlformats.org/drawingml/2006/main" xmlns:r="http://schemas.openxmlformats.org/officeDocument/2006/relationships" xmlns:p="http://schemas.openxmlformats.org/presentationml/2006/main">
   <p:cSld>
     <p:spTree>
@@ -3713,7 +3808,7 @@
 </p:sld>
 </file>
 
-<file path=ppt/slides/slide5.xml><?xml version="1.0" encoding="utf-8"?>
+<file path=ppt/slides/slide6.xml><?xml version="1.0" encoding="utf-8"?>
 <p:sld xmlns:a="http://schemas.openxmlformats.org/drawingml/2006/main" xmlns:r="http://schemas.openxmlformats.org/officeDocument/2006/relationships" xmlns:p="http://schemas.openxmlformats.org/presentationml/2006/main">
   <p:cSld>
     <p:spTree>
@@ -3811,7 +3906,7 @@
 </p:sld>
 </file>
 
-<file path=ppt/slides/slide6.xml><?xml version="1.0" encoding="utf-8"?>
+<file path=ppt/slides/slide7.xml><?xml version="1.0" encoding="utf-8"?>
 <p:sld xmlns:a="http://schemas.openxmlformats.org/drawingml/2006/main" xmlns:r="http://schemas.openxmlformats.org/officeDocument/2006/relationships" xmlns:p="http://schemas.openxmlformats.org/presentationml/2006/main">
   <p:cSld>
     <p:spTree>
@@ -3909,7 +4004,7 @@
 </p:sld>
 </file>
 
-<file path=ppt/slides/slide7.xml><?xml version="1.0" encoding="utf-8"?>
+<file path=ppt/slides/slide8.xml><?xml version="1.0" encoding="utf-8"?>
 <p:sld xmlns:a="http://schemas.openxmlformats.org/drawingml/2006/main" xmlns:r="http://schemas.openxmlformats.org/officeDocument/2006/relationships" xmlns:p="http://schemas.openxmlformats.org/presentationml/2006/main">
   <p:cSld>
     <p:spTree>
@@ -4007,7 +4102,7 @@
 </p:sld>
 </file>
 
-<file path=ppt/slides/slide8.xml><?xml version="1.0" encoding="utf-8"?>
+<file path=ppt/slides/slide9.xml><?xml version="1.0" encoding="utf-8"?>
 <p:sld xmlns:a="http://schemas.openxmlformats.org/drawingml/2006/main" xmlns:r="http://schemas.openxmlformats.org/officeDocument/2006/relationships" xmlns:p="http://schemas.openxmlformats.org/presentationml/2006/main">
   <p:cSld>
     <p:spTree>
@@ -4064,72 +4159,6 @@
     <p:extLst>
       <p:ext uri="{BB962C8B-B14F-4D97-AF65-F5344CB8AC3E}">
         <p14:creationId xmlns:p14="http://schemas.microsoft.com/office/powerpoint/2010/main" val="1930558632"/>
-      </p:ext>
-    </p:extLst>
-  </p:cSld>
-  <p:clrMapOvr>
-    <a:masterClrMapping/>
-  </p:clrMapOvr>
-</p:sld>
-</file>
-
-<file path=ppt/slides/slide9.xml><?xml version="1.0" encoding="utf-8"?>
-<p:sld xmlns:a="http://schemas.openxmlformats.org/drawingml/2006/main" xmlns:r="http://schemas.openxmlformats.org/officeDocument/2006/relationships" xmlns:p="http://schemas.openxmlformats.org/presentationml/2006/main">
-  <p:cSld>
-    <p:spTree>
-      <p:nvGrpSpPr>
-        <p:cNvPr id="1" name=""/>
-        <p:cNvGrpSpPr/>
-        <p:nvPr/>
-      </p:nvGrpSpPr>
-      <p:grpSpPr>
-        <a:xfrm>
-          <a:off x="0" y="0"/>
-          <a:ext cx="0" cy="0"/>
-          <a:chOff x="0" y="0"/>
-          <a:chExt cx="0" cy="0"/>
-        </a:xfrm>
-      </p:grpSpPr>
-      <p:pic>
-        <p:nvPicPr>
-          <p:cNvPr id="6" name="Picture 5">
-            <a:extLst>
-              <a:ext uri="{FF2B5EF4-FFF2-40B4-BE49-F238E27FC236}">
-                <a16:creationId xmlns:a16="http://schemas.microsoft.com/office/drawing/2014/main" id="{B5A34B44-DFC3-4E59-9F30-88F3394A6D5D}"/>
-              </a:ext>
-            </a:extLst>
-          </p:cNvPr>
-          <p:cNvPicPr>
-            <a:picLocks noChangeAspect="1"/>
-          </p:cNvPicPr>
-          <p:nvPr/>
-        </p:nvPicPr>
-        <p:blipFill>
-          <a:blip r:embed="rId2">
-            <a:extLst>
-              <a:ext uri="{28A0092B-C50C-407E-A947-70E740481C1C}">
-                <a14:useLocalDpi xmlns:a14="http://schemas.microsoft.com/office/drawing/2010/main" val="0"/>
-              </a:ext>
-            </a:extLst>
-          </a:blip>
-          <a:stretch>
-            <a:fillRect/>
-          </a:stretch>
-        </p:blipFill>
-        <p:spPr>
-          <a:xfrm>
-            <a:off x="4236099" y="1482455"/>
-            <a:ext cx="3526971" cy="3526971"/>
-          </a:xfrm>
-          <a:prstGeom prst="rect">
-            <a:avLst/>
-          </a:prstGeom>
-        </p:spPr>
-      </p:pic>
-    </p:spTree>
-    <p:extLst>
-      <p:ext uri="{BB962C8B-B14F-4D97-AF65-F5344CB8AC3E}">
-        <p14:creationId xmlns:p14="http://schemas.microsoft.com/office/powerpoint/2010/main" val="2150512204"/>
       </p:ext>
     </p:extLst>
   </p:cSld>

</xml_diff>

<commit_message>
Slide deck upload test finished Pause and play fixed
</commit_message>
<xml_diff>
--- a/web/media/ppt/timelineQRCode.pptx
+++ b/web/media/ppt/timelineQRCode.pptx
@@ -15,6 +15,26 @@
     <p:sldId id="273" r:id="rId9"/>
     <p:sldId id="272" r:id="rId10"/>
     <p:sldId id="269" r:id="rId11"/>
+    <p:sldId id="275" r:id="rId12"/>
+    <p:sldId id="276" r:id="rId13"/>
+    <p:sldId id="277" r:id="rId14"/>
+    <p:sldId id="278" r:id="rId15"/>
+    <p:sldId id="279" r:id="rId16"/>
+    <p:sldId id="280" r:id="rId17"/>
+    <p:sldId id="281" r:id="rId18"/>
+    <p:sldId id="282" r:id="rId19"/>
+    <p:sldId id="283" r:id="rId20"/>
+    <p:sldId id="284" r:id="rId21"/>
+    <p:sldId id="285" r:id="rId22"/>
+    <p:sldId id="286" r:id="rId23"/>
+    <p:sldId id="287" r:id="rId24"/>
+    <p:sldId id="288" r:id="rId25"/>
+    <p:sldId id="289" r:id="rId26"/>
+    <p:sldId id="290" r:id="rId27"/>
+    <p:sldId id="291" r:id="rId28"/>
+    <p:sldId id="292" r:id="rId29"/>
+    <p:sldId id="293" r:id="rId30"/>
+    <p:sldId id="294" r:id="rId31"/>
   </p:sldIdLst>
   <p:sldSz cx="12192000" cy="6858000"/>
   <p:notesSz cx="6858000" cy="9144000"/>
@@ -272,7 +292,7 @@
           <a:p>
             <a:fld id="{3ABE52FA-3C23-44BD-B501-603726A78153}" type="datetimeFigureOut">
               <a:rPr lang="en-US" smtClean="0"/>
-              <a:t>15-02-18</a:t>
+              <a:t>19-02-18</a:t>
             </a:fld>
             <a:endParaRPr lang="en-US"/>
           </a:p>
@@ -470,7 +490,7 @@
           <a:p>
             <a:fld id="{3ABE52FA-3C23-44BD-B501-603726A78153}" type="datetimeFigureOut">
               <a:rPr lang="en-US" smtClean="0"/>
-              <a:t>15-02-18</a:t>
+              <a:t>19-02-18</a:t>
             </a:fld>
             <a:endParaRPr lang="en-US"/>
           </a:p>
@@ -678,7 +698,7 @@
           <a:p>
             <a:fld id="{3ABE52FA-3C23-44BD-B501-603726A78153}" type="datetimeFigureOut">
               <a:rPr lang="en-US" smtClean="0"/>
-              <a:t>15-02-18</a:t>
+              <a:t>19-02-18</a:t>
             </a:fld>
             <a:endParaRPr lang="en-US"/>
           </a:p>
@@ -876,7 +896,7 @@
           <a:p>
             <a:fld id="{3ABE52FA-3C23-44BD-B501-603726A78153}" type="datetimeFigureOut">
               <a:rPr lang="en-US" smtClean="0"/>
-              <a:t>15-02-18</a:t>
+              <a:t>19-02-18</a:t>
             </a:fld>
             <a:endParaRPr lang="en-US"/>
           </a:p>
@@ -1151,7 +1171,7 @@
           <a:p>
             <a:fld id="{3ABE52FA-3C23-44BD-B501-603726A78153}" type="datetimeFigureOut">
               <a:rPr lang="en-US" smtClean="0"/>
-              <a:t>15-02-18</a:t>
+              <a:t>19-02-18</a:t>
             </a:fld>
             <a:endParaRPr lang="en-US"/>
           </a:p>
@@ -1416,7 +1436,7 @@
           <a:p>
             <a:fld id="{3ABE52FA-3C23-44BD-B501-603726A78153}" type="datetimeFigureOut">
               <a:rPr lang="en-US" smtClean="0"/>
-              <a:t>15-02-18</a:t>
+              <a:t>19-02-18</a:t>
             </a:fld>
             <a:endParaRPr lang="en-US"/>
           </a:p>
@@ -1828,7 +1848,7 @@
           <a:p>
             <a:fld id="{3ABE52FA-3C23-44BD-B501-603726A78153}" type="datetimeFigureOut">
               <a:rPr lang="en-US" smtClean="0"/>
-              <a:t>15-02-18</a:t>
+              <a:t>19-02-18</a:t>
             </a:fld>
             <a:endParaRPr lang="en-US"/>
           </a:p>
@@ -1969,7 +1989,7 @@
           <a:p>
             <a:fld id="{3ABE52FA-3C23-44BD-B501-603726A78153}" type="datetimeFigureOut">
               <a:rPr lang="en-US" smtClean="0"/>
-              <a:t>15-02-18</a:t>
+              <a:t>19-02-18</a:t>
             </a:fld>
             <a:endParaRPr lang="en-US"/>
           </a:p>
@@ -2082,7 +2102,7 @@
           <a:p>
             <a:fld id="{3ABE52FA-3C23-44BD-B501-603726A78153}" type="datetimeFigureOut">
               <a:rPr lang="en-US" smtClean="0"/>
-              <a:t>15-02-18</a:t>
+              <a:t>19-02-18</a:t>
             </a:fld>
             <a:endParaRPr lang="en-US"/>
           </a:p>
@@ -2393,7 +2413,7 @@
           <a:p>
             <a:fld id="{3ABE52FA-3C23-44BD-B501-603726A78153}" type="datetimeFigureOut">
               <a:rPr lang="en-US" smtClean="0"/>
-              <a:t>15-02-18</a:t>
+              <a:t>19-02-18</a:t>
             </a:fld>
             <a:endParaRPr lang="en-US"/>
           </a:p>
@@ -2681,7 +2701,7 @@
           <a:p>
             <a:fld id="{3ABE52FA-3C23-44BD-B501-603726A78153}" type="datetimeFigureOut">
               <a:rPr lang="en-US" smtClean="0"/>
-              <a:t>15-02-18</a:t>
+              <a:t>19-02-18</a:t>
             </a:fld>
             <a:endParaRPr lang="en-US"/>
           </a:p>
@@ -2922,7 +2942,7 @@
           <a:p>
             <a:fld id="{3ABE52FA-3C23-44BD-B501-603726A78153}" type="datetimeFigureOut">
               <a:rPr lang="en-US" smtClean="0"/>
-              <a:t>15-02-18</a:t>
+              <a:t>19-02-18</a:t>
             </a:fld>
             <a:endParaRPr lang="en-US"/>
           </a:p>
@@ -3448,6 +3468,546 @@
 </p:sld>
 </file>
 
+<file path=ppt/slides/slide11.xml><?xml version="1.0" encoding="utf-8"?>
+<p:sld xmlns:a="http://schemas.openxmlformats.org/drawingml/2006/main" xmlns:r="http://schemas.openxmlformats.org/officeDocument/2006/relationships" xmlns:p="http://schemas.openxmlformats.org/presentationml/2006/main">
+  <p:cSld>
+    <p:spTree>
+      <p:nvGrpSpPr>
+        <p:cNvPr id="1" name=""/>
+        <p:cNvGrpSpPr/>
+        <p:nvPr/>
+      </p:nvGrpSpPr>
+      <p:grpSpPr>
+        <a:xfrm>
+          <a:off x="0" y="0"/>
+          <a:ext cx="0" cy="0"/>
+          <a:chOff x="0" y="0"/>
+          <a:chExt cx="0" cy="0"/>
+        </a:xfrm>
+      </p:grpSpPr>
+      <p:pic>
+        <p:nvPicPr>
+          <p:cNvPr id="4" name="Picture 3">
+            <a:extLst>
+              <a:ext uri="{FF2B5EF4-FFF2-40B4-BE49-F238E27FC236}">
+                <a16:creationId xmlns:a16="http://schemas.microsoft.com/office/drawing/2014/main" id="{28C84440-8FD8-4012-98BF-BF7432F12D3B}"/>
+              </a:ext>
+            </a:extLst>
+          </p:cNvPr>
+          <p:cNvPicPr>
+            <a:picLocks noChangeAspect="1"/>
+          </p:cNvPicPr>
+          <p:nvPr/>
+        </p:nvPicPr>
+        <p:blipFill>
+          <a:blip r:embed="rId2"/>
+          <a:stretch>
+            <a:fillRect/>
+          </a:stretch>
+        </p:blipFill>
+        <p:spPr>
+          <a:xfrm>
+            <a:off x="4014172" y="1599000"/>
+            <a:ext cx="3586253" cy="3530867"/>
+          </a:xfrm>
+          <a:prstGeom prst="rect">
+            <a:avLst/>
+          </a:prstGeom>
+        </p:spPr>
+      </p:pic>
+    </p:spTree>
+    <p:extLst>
+      <p:ext uri="{BB962C8B-B14F-4D97-AF65-F5344CB8AC3E}">
+        <p14:creationId xmlns:p14="http://schemas.microsoft.com/office/powerpoint/2010/main" val="521217787"/>
+      </p:ext>
+    </p:extLst>
+  </p:cSld>
+  <p:clrMapOvr>
+    <a:masterClrMapping/>
+  </p:clrMapOvr>
+</p:sld>
+</file>
+
+<file path=ppt/slides/slide12.xml><?xml version="1.0" encoding="utf-8"?>
+<p:sld xmlns:a="http://schemas.openxmlformats.org/drawingml/2006/main" xmlns:r="http://schemas.openxmlformats.org/officeDocument/2006/relationships" xmlns:p="http://schemas.openxmlformats.org/presentationml/2006/main">
+  <p:cSld>
+    <p:spTree>
+      <p:nvGrpSpPr>
+        <p:cNvPr id="1" name=""/>
+        <p:cNvGrpSpPr/>
+        <p:nvPr/>
+      </p:nvGrpSpPr>
+      <p:grpSpPr>
+        <a:xfrm>
+          <a:off x="0" y="0"/>
+          <a:ext cx="0" cy="0"/>
+          <a:chOff x="0" y="0"/>
+          <a:chExt cx="0" cy="0"/>
+        </a:xfrm>
+      </p:grpSpPr>
+      <p:pic>
+        <p:nvPicPr>
+          <p:cNvPr id="4" name="Picture 3">
+            <a:extLst>
+              <a:ext uri="{FF2B5EF4-FFF2-40B4-BE49-F238E27FC236}">
+                <a16:creationId xmlns:a16="http://schemas.microsoft.com/office/drawing/2014/main" id="{2D22AF6A-40AE-4A85-AA7F-A07BDCCFF92B}"/>
+              </a:ext>
+            </a:extLst>
+          </p:cNvPr>
+          <p:cNvPicPr>
+            <a:picLocks noChangeAspect="1"/>
+          </p:cNvPicPr>
+          <p:nvPr/>
+        </p:nvPicPr>
+        <p:blipFill>
+          <a:blip r:embed="rId2"/>
+          <a:stretch>
+            <a:fillRect/>
+          </a:stretch>
+        </p:blipFill>
+        <p:spPr>
+          <a:xfrm>
+            <a:off x="4127238" y="1669409"/>
+            <a:ext cx="3468168" cy="3477236"/>
+          </a:xfrm>
+          <a:prstGeom prst="rect">
+            <a:avLst/>
+          </a:prstGeom>
+        </p:spPr>
+      </p:pic>
+    </p:spTree>
+    <p:extLst>
+      <p:ext uri="{BB962C8B-B14F-4D97-AF65-F5344CB8AC3E}">
+        <p14:creationId xmlns:p14="http://schemas.microsoft.com/office/powerpoint/2010/main" val="1434139097"/>
+      </p:ext>
+    </p:extLst>
+  </p:cSld>
+  <p:clrMapOvr>
+    <a:masterClrMapping/>
+  </p:clrMapOvr>
+</p:sld>
+</file>
+
+<file path=ppt/slides/slide13.xml><?xml version="1.0" encoding="utf-8"?>
+<p:sld xmlns:a="http://schemas.openxmlformats.org/drawingml/2006/main" xmlns:r="http://schemas.openxmlformats.org/officeDocument/2006/relationships" xmlns:p="http://schemas.openxmlformats.org/presentationml/2006/main">
+  <p:cSld>
+    <p:spTree>
+      <p:nvGrpSpPr>
+        <p:cNvPr id="1" name=""/>
+        <p:cNvGrpSpPr/>
+        <p:nvPr/>
+      </p:nvGrpSpPr>
+      <p:grpSpPr>
+        <a:xfrm>
+          <a:off x="0" y="0"/>
+          <a:ext cx="0" cy="0"/>
+          <a:chOff x="0" y="0"/>
+          <a:chExt cx="0" cy="0"/>
+        </a:xfrm>
+      </p:grpSpPr>
+      <p:pic>
+        <p:nvPicPr>
+          <p:cNvPr id="5" name="Picture 4">
+            <a:extLst>
+              <a:ext uri="{FF2B5EF4-FFF2-40B4-BE49-F238E27FC236}">
+                <a16:creationId xmlns:a16="http://schemas.microsoft.com/office/drawing/2014/main" id="{C2A72489-7AF7-4899-87A3-7BE9C9AF6544}"/>
+              </a:ext>
+            </a:extLst>
+          </p:cNvPr>
+          <p:cNvPicPr>
+            <a:picLocks noChangeAspect="1"/>
+          </p:cNvPicPr>
+          <p:nvPr/>
+        </p:nvPicPr>
+        <p:blipFill>
+          <a:blip r:embed="rId2"/>
+          <a:stretch>
+            <a:fillRect/>
+          </a:stretch>
+        </p:blipFill>
+        <p:spPr>
+          <a:xfrm>
+            <a:off x="4092410" y="1723268"/>
+            <a:ext cx="3449294" cy="3440156"/>
+          </a:xfrm>
+          <a:prstGeom prst="rect">
+            <a:avLst/>
+          </a:prstGeom>
+        </p:spPr>
+      </p:pic>
+    </p:spTree>
+    <p:extLst>
+      <p:ext uri="{BB962C8B-B14F-4D97-AF65-F5344CB8AC3E}">
+        <p14:creationId xmlns:p14="http://schemas.microsoft.com/office/powerpoint/2010/main" val="947272878"/>
+      </p:ext>
+    </p:extLst>
+  </p:cSld>
+  <p:clrMapOvr>
+    <a:masterClrMapping/>
+  </p:clrMapOvr>
+</p:sld>
+</file>
+
+<file path=ppt/slides/slide14.xml><?xml version="1.0" encoding="utf-8"?>
+<p:sld xmlns:a="http://schemas.openxmlformats.org/drawingml/2006/main" xmlns:r="http://schemas.openxmlformats.org/officeDocument/2006/relationships" xmlns:p="http://schemas.openxmlformats.org/presentationml/2006/main">
+  <p:cSld>
+    <p:spTree>
+      <p:nvGrpSpPr>
+        <p:cNvPr id="1" name=""/>
+        <p:cNvGrpSpPr/>
+        <p:nvPr/>
+      </p:nvGrpSpPr>
+      <p:grpSpPr>
+        <a:xfrm>
+          <a:off x="0" y="0"/>
+          <a:ext cx="0" cy="0"/>
+          <a:chOff x="0" y="0"/>
+          <a:chExt cx="0" cy="0"/>
+        </a:xfrm>
+      </p:grpSpPr>
+      <p:pic>
+        <p:nvPicPr>
+          <p:cNvPr id="4" name="Picture 3">
+            <a:extLst>
+              <a:ext uri="{FF2B5EF4-FFF2-40B4-BE49-F238E27FC236}">
+                <a16:creationId xmlns:a16="http://schemas.microsoft.com/office/drawing/2014/main" id="{BFE0B1D4-B2C1-490D-93FA-6098FB6EDE9B}"/>
+              </a:ext>
+            </a:extLst>
+          </p:cNvPr>
+          <p:cNvPicPr>
+            <a:picLocks noChangeAspect="1"/>
+          </p:cNvPicPr>
+          <p:nvPr/>
+        </p:nvPicPr>
+        <p:blipFill>
+          <a:blip r:embed="rId2"/>
+          <a:stretch>
+            <a:fillRect/>
+          </a:stretch>
+        </p:blipFill>
+        <p:spPr>
+          <a:xfrm>
+            <a:off x="4202953" y="1690100"/>
+            <a:ext cx="3263250" cy="3271987"/>
+          </a:xfrm>
+          <a:prstGeom prst="rect">
+            <a:avLst/>
+          </a:prstGeom>
+        </p:spPr>
+      </p:pic>
+    </p:spTree>
+    <p:extLst>
+      <p:ext uri="{BB962C8B-B14F-4D97-AF65-F5344CB8AC3E}">
+        <p14:creationId xmlns:p14="http://schemas.microsoft.com/office/powerpoint/2010/main" val="1571749034"/>
+      </p:ext>
+    </p:extLst>
+  </p:cSld>
+  <p:clrMapOvr>
+    <a:masterClrMapping/>
+  </p:clrMapOvr>
+</p:sld>
+</file>
+
+<file path=ppt/slides/slide15.xml><?xml version="1.0" encoding="utf-8"?>
+<p:sld xmlns:a="http://schemas.openxmlformats.org/drawingml/2006/main" xmlns:r="http://schemas.openxmlformats.org/officeDocument/2006/relationships" xmlns:p="http://schemas.openxmlformats.org/presentationml/2006/main">
+  <p:cSld>
+    <p:spTree>
+      <p:nvGrpSpPr>
+        <p:cNvPr id="1" name=""/>
+        <p:cNvGrpSpPr/>
+        <p:nvPr/>
+      </p:nvGrpSpPr>
+      <p:grpSpPr>
+        <a:xfrm>
+          <a:off x="0" y="0"/>
+          <a:ext cx="0" cy="0"/>
+          <a:chOff x="0" y="0"/>
+          <a:chExt cx="0" cy="0"/>
+        </a:xfrm>
+      </p:grpSpPr>
+      <p:pic>
+        <p:nvPicPr>
+          <p:cNvPr id="4" name="Picture 3">
+            <a:extLst>
+              <a:ext uri="{FF2B5EF4-FFF2-40B4-BE49-F238E27FC236}">
+                <a16:creationId xmlns:a16="http://schemas.microsoft.com/office/drawing/2014/main" id="{2CDBCBD4-2709-4A9B-BA44-3D1DBBFFFE21}"/>
+              </a:ext>
+            </a:extLst>
+          </p:cNvPr>
+          <p:cNvPicPr>
+            <a:picLocks noChangeAspect="1"/>
+          </p:cNvPicPr>
+          <p:nvPr/>
+        </p:nvPicPr>
+        <p:blipFill>
+          <a:blip r:embed="rId2"/>
+          <a:stretch>
+            <a:fillRect/>
+          </a:stretch>
+        </p:blipFill>
+        <p:spPr>
+          <a:xfrm>
+            <a:off x="4243602" y="1718711"/>
+            <a:ext cx="3147100" cy="3201432"/>
+          </a:xfrm>
+          <a:prstGeom prst="rect">
+            <a:avLst/>
+          </a:prstGeom>
+        </p:spPr>
+      </p:pic>
+    </p:spTree>
+    <p:extLst>
+      <p:ext uri="{BB962C8B-B14F-4D97-AF65-F5344CB8AC3E}">
+        <p14:creationId xmlns:p14="http://schemas.microsoft.com/office/powerpoint/2010/main" val="288219593"/>
+      </p:ext>
+    </p:extLst>
+  </p:cSld>
+  <p:clrMapOvr>
+    <a:masterClrMapping/>
+  </p:clrMapOvr>
+</p:sld>
+</file>
+
+<file path=ppt/slides/slide16.xml><?xml version="1.0" encoding="utf-8"?>
+<p:sld xmlns:a="http://schemas.openxmlformats.org/drawingml/2006/main" xmlns:r="http://schemas.openxmlformats.org/officeDocument/2006/relationships" xmlns:p="http://schemas.openxmlformats.org/presentationml/2006/main">
+  <p:cSld>
+    <p:spTree>
+      <p:nvGrpSpPr>
+        <p:cNvPr id="1" name=""/>
+        <p:cNvGrpSpPr/>
+        <p:nvPr/>
+      </p:nvGrpSpPr>
+      <p:grpSpPr>
+        <a:xfrm>
+          <a:off x="0" y="0"/>
+          <a:ext cx="0" cy="0"/>
+          <a:chOff x="0" y="0"/>
+          <a:chExt cx="0" cy="0"/>
+        </a:xfrm>
+      </p:grpSpPr>
+      <p:pic>
+        <p:nvPicPr>
+          <p:cNvPr id="4" name="Picture 3">
+            <a:extLst>
+              <a:ext uri="{FF2B5EF4-FFF2-40B4-BE49-F238E27FC236}">
+                <a16:creationId xmlns:a16="http://schemas.microsoft.com/office/drawing/2014/main" id="{9768C336-574E-41F6-AED9-C3DA3C2BCAA5}"/>
+              </a:ext>
+            </a:extLst>
+          </p:cNvPr>
+          <p:cNvPicPr>
+            <a:picLocks noChangeAspect="1"/>
+          </p:cNvPicPr>
+          <p:nvPr/>
+        </p:nvPicPr>
+        <p:blipFill>
+          <a:blip r:embed="rId2"/>
+          <a:stretch>
+            <a:fillRect/>
+          </a:stretch>
+        </p:blipFill>
+        <p:spPr>
+          <a:xfrm>
+            <a:off x="4367387" y="1795244"/>
+            <a:ext cx="2995975" cy="3015842"/>
+          </a:xfrm>
+          <a:prstGeom prst="rect">
+            <a:avLst/>
+          </a:prstGeom>
+        </p:spPr>
+      </p:pic>
+    </p:spTree>
+    <p:extLst>
+      <p:ext uri="{BB962C8B-B14F-4D97-AF65-F5344CB8AC3E}">
+        <p14:creationId xmlns:p14="http://schemas.microsoft.com/office/powerpoint/2010/main" val="3952404275"/>
+      </p:ext>
+    </p:extLst>
+  </p:cSld>
+  <p:clrMapOvr>
+    <a:masterClrMapping/>
+  </p:clrMapOvr>
+</p:sld>
+</file>
+
+<file path=ppt/slides/slide17.xml><?xml version="1.0" encoding="utf-8"?>
+<p:sld xmlns:a="http://schemas.openxmlformats.org/drawingml/2006/main" xmlns:r="http://schemas.openxmlformats.org/officeDocument/2006/relationships" xmlns:p="http://schemas.openxmlformats.org/presentationml/2006/main">
+  <p:cSld>
+    <p:spTree>
+      <p:nvGrpSpPr>
+        <p:cNvPr id="1" name=""/>
+        <p:cNvGrpSpPr/>
+        <p:nvPr/>
+      </p:nvGrpSpPr>
+      <p:grpSpPr>
+        <a:xfrm>
+          <a:off x="0" y="0"/>
+          <a:ext cx="0" cy="0"/>
+          <a:chOff x="0" y="0"/>
+          <a:chExt cx="0" cy="0"/>
+        </a:xfrm>
+      </p:grpSpPr>
+      <p:pic>
+        <p:nvPicPr>
+          <p:cNvPr id="4" name="Picture 3">
+            <a:extLst>
+              <a:ext uri="{FF2B5EF4-FFF2-40B4-BE49-F238E27FC236}">
+                <a16:creationId xmlns:a16="http://schemas.microsoft.com/office/drawing/2014/main" id="{D8301FFB-C250-4FA9-A200-5D0D921A3918}"/>
+              </a:ext>
+            </a:extLst>
+          </p:cNvPr>
+          <p:cNvPicPr>
+            <a:picLocks noChangeAspect="1"/>
+          </p:cNvPicPr>
+          <p:nvPr/>
+        </p:nvPicPr>
+        <p:blipFill>
+          <a:blip r:embed="rId2"/>
+          <a:stretch>
+            <a:fillRect/>
+          </a:stretch>
+        </p:blipFill>
+        <p:spPr>
+          <a:xfrm>
+            <a:off x="4298287" y="1764429"/>
+            <a:ext cx="2865911" cy="2862100"/>
+          </a:xfrm>
+          <a:prstGeom prst="rect">
+            <a:avLst/>
+          </a:prstGeom>
+        </p:spPr>
+      </p:pic>
+    </p:spTree>
+    <p:extLst>
+      <p:ext uri="{BB962C8B-B14F-4D97-AF65-F5344CB8AC3E}">
+        <p14:creationId xmlns:p14="http://schemas.microsoft.com/office/powerpoint/2010/main" val="2922033762"/>
+      </p:ext>
+    </p:extLst>
+  </p:cSld>
+  <p:clrMapOvr>
+    <a:masterClrMapping/>
+  </p:clrMapOvr>
+</p:sld>
+</file>
+
+<file path=ppt/slides/slide18.xml><?xml version="1.0" encoding="utf-8"?>
+<p:sld xmlns:a="http://schemas.openxmlformats.org/drawingml/2006/main" xmlns:r="http://schemas.openxmlformats.org/officeDocument/2006/relationships" xmlns:p="http://schemas.openxmlformats.org/presentationml/2006/main">
+  <p:cSld>
+    <p:spTree>
+      <p:nvGrpSpPr>
+        <p:cNvPr id="1" name=""/>
+        <p:cNvGrpSpPr/>
+        <p:nvPr/>
+      </p:nvGrpSpPr>
+      <p:grpSpPr>
+        <a:xfrm>
+          <a:off x="0" y="0"/>
+          <a:ext cx="0" cy="0"/>
+          <a:chOff x="0" y="0"/>
+          <a:chExt cx="0" cy="0"/>
+        </a:xfrm>
+      </p:grpSpPr>
+      <p:pic>
+        <p:nvPicPr>
+          <p:cNvPr id="4" name="Picture 3">
+            <a:extLst>
+              <a:ext uri="{FF2B5EF4-FFF2-40B4-BE49-F238E27FC236}">
+                <a16:creationId xmlns:a16="http://schemas.microsoft.com/office/drawing/2014/main" id="{61665D52-D132-464E-88B0-9168A6E61FEE}"/>
+              </a:ext>
+            </a:extLst>
+          </p:cNvPr>
+          <p:cNvPicPr>
+            <a:picLocks noChangeAspect="1"/>
+          </p:cNvPicPr>
+          <p:nvPr/>
+        </p:nvPicPr>
+        <p:blipFill>
+          <a:blip r:embed="rId2"/>
+          <a:stretch>
+            <a:fillRect/>
+          </a:stretch>
+        </p:blipFill>
+        <p:spPr>
+          <a:xfrm>
+            <a:off x="4273176" y="1635853"/>
+            <a:ext cx="3034212" cy="3082954"/>
+          </a:xfrm>
+          <a:prstGeom prst="rect">
+            <a:avLst/>
+          </a:prstGeom>
+        </p:spPr>
+      </p:pic>
+    </p:spTree>
+    <p:extLst>
+      <p:ext uri="{BB962C8B-B14F-4D97-AF65-F5344CB8AC3E}">
+        <p14:creationId xmlns:p14="http://schemas.microsoft.com/office/powerpoint/2010/main" val="649986408"/>
+      </p:ext>
+    </p:extLst>
+  </p:cSld>
+  <p:clrMapOvr>
+    <a:masterClrMapping/>
+  </p:clrMapOvr>
+</p:sld>
+</file>
+
+<file path=ppt/slides/slide19.xml><?xml version="1.0" encoding="utf-8"?>
+<p:sld xmlns:a="http://schemas.openxmlformats.org/drawingml/2006/main" xmlns:r="http://schemas.openxmlformats.org/officeDocument/2006/relationships" xmlns:p="http://schemas.openxmlformats.org/presentationml/2006/main">
+  <p:cSld>
+    <p:spTree>
+      <p:nvGrpSpPr>
+        <p:cNvPr id="1" name=""/>
+        <p:cNvGrpSpPr/>
+        <p:nvPr/>
+      </p:nvGrpSpPr>
+      <p:grpSpPr>
+        <a:xfrm>
+          <a:off x="0" y="0"/>
+          <a:ext cx="0" cy="0"/>
+          <a:chOff x="0" y="0"/>
+          <a:chExt cx="0" cy="0"/>
+        </a:xfrm>
+      </p:grpSpPr>
+      <p:pic>
+        <p:nvPicPr>
+          <p:cNvPr id="4" name="Picture 3">
+            <a:extLst>
+              <a:ext uri="{FF2B5EF4-FFF2-40B4-BE49-F238E27FC236}">
+                <a16:creationId xmlns:a16="http://schemas.microsoft.com/office/drawing/2014/main" id="{0F23656C-207E-4C95-8316-8F332735405F}"/>
+              </a:ext>
+            </a:extLst>
+          </p:cNvPr>
+          <p:cNvPicPr>
+            <a:picLocks noChangeAspect="1"/>
+          </p:cNvPicPr>
+          <p:nvPr/>
+        </p:nvPicPr>
+        <p:blipFill>
+          <a:blip r:embed="rId2"/>
+          <a:stretch>
+            <a:fillRect/>
+          </a:stretch>
+        </p:blipFill>
+        <p:spPr>
+          <a:xfrm>
+            <a:off x="4668834" y="1818321"/>
+            <a:ext cx="2713478" cy="2724317"/>
+          </a:xfrm>
+          <a:prstGeom prst="rect">
+            <a:avLst/>
+          </a:prstGeom>
+        </p:spPr>
+      </p:pic>
+    </p:spTree>
+    <p:extLst>
+      <p:ext uri="{BB962C8B-B14F-4D97-AF65-F5344CB8AC3E}">
+        <p14:creationId xmlns:p14="http://schemas.microsoft.com/office/powerpoint/2010/main" val="3975928222"/>
+      </p:ext>
+    </p:extLst>
+  </p:cSld>
+  <p:clrMapOvr>
+    <a:masterClrMapping/>
+  </p:clrMapOvr>
+</p:sld>
+</file>
+
 <file path=ppt/slides/slide2.xml><?xml version="1.0" encoding="utf-8"?>
 <p:sld xmlns:a="http://schemas.openxmlformats.org/drawingml/2006/main" xmlns:r="http://schemas.openxmlformats.org/officeDocument/2006/relationships" xmlns:p="http://schemas.openxmlformats.org/presentationml/2006/main">
   <p:cSld>
@@ -3505,6 +4065,606 @@
     <p:extLst>
       <p:ext uri="{BB962C8B-B14F-4D97-AF65-F5344CB8AC3E}">
         <p14:creationId xmlns:p14="http://schemas.microsoft.com/office/powerpoint/2010/main" val="4010745111"/>
+      </p:ext>
+    </p:extLst>
+  </p:cSld>
+  <p:clrMapOvr>
+    <a:masterClrMapping/>
+  </p:clrMapOvr>
+</p:sld>
+</file>
+
+<file path=ppt/slides/slide20.xml><?xml version="1.0" encoding="utf-8"?>
+<p:sld xmlns:a="http://schemas.openxmlformats.org/drawingml/2006/main" xmlns:r="http://schemas.openxmlformats.org/officeDocument/2006/relationships" xmlns:p="http://schemas.openxmlformats.org/presentationml/2006/main">
+  <p:cSld>
+    <p:spTree>
+      <p:nvGrpSpPr>
+        <p:cNvPr id="1" name=""/>
+        <p:cNvGrpSpPr/>
+        <p:nvPr/>
+      </p:nvGrpSpPr>
+      <p:grpSpPr>
+        <a:xfrm>
+          <a:off x="0" y="0"/>
+          <a:ext cx="0" cy="0"/>
+          <a:chOff x="0" y="0"/>
+          <a:chExt cx="0" cy="0"/>
+        </a:xfrm>
+      </p:grpSpPr>
+      <p:pic>
+        <p:nvPicPr>
+          <p:cNvPr id="4" name="Picture 3">
+            <a:extLst>
+              <a:ext uri="{FF2B5EF4-FFF2-40B4-BE49-F238E27FC236}">
+                <a16:creationId xmlns:a16="http://schemas.microsoft.com/office/drawing/2014/main" id="{24363600-039F-43C5-95EB-167DF4B49667}"/>
+              </a:ext>
+            </a:extLst>
+          </p:cNvPr>
+          <p:cNvPicPr>
+            <a:picLocks noChangeAspect="1"/>
+          </p:cNvPicPr>
+          <p:nvPr/>
+        </p:nvPicPr>
+        <p:blipFill>
+          <a:blip r:embed="rId2"/>
+          <a:stretch>
+            <a:fillRect/>
+          </a:stretch>
+        </p:blipFill>
+        <p:spPr>
+          <a:xfrm>
+            <a:off x="4747470" y="1899407"/>
+            <a:ext cx="2693565" cy="2693565"/>
+          </a:xfrm>
+          <a:prstGeom prst="rect">
+            <a:avLst/>
+          </a:prstGeom>
+        </p:spPr>
+      </p:pic>
+    </p:spTree>
+    <p:extLst>
+      <p:ext uri="{BB962C8B-B14F-4D97-AF65-F5344CB8AC3E}">
+        <p14:creationId xmlns:p14="http://schemas.microsoft.com/office/powerpoint/2010/main" val="884797505"/>
+      </p:ext>
+    </p:extLst>
+  </p:cSld>
+  <p:clrMapOvr>
+    <a:masterClrMapping/>
+  </p:clrMapOvr>
+</p:sld>
+</file>
+
+<file path=ppt/slides/slide21.xml><?xml version="1.0" encoding="utf-8"?>
+<p:sld xmlns:a="http://schemas.openxmlformats.org/drawingml/2006/main" xmlns:r="http://schemas.openxmlformats.org/officeDocument/2006/relationships" xmlns:p="http://schemas.openxmlformats.org/presentationml/2006/main">
+  <p:cSld>
+    <p:spTree>
+      <p:nvGrpSpPr>
+        <p:cNvPr id="1" name=""/>
+        <p:cNvGrpSpPr/>
+        <p:nvPr/>
+      </p:nvGrpSpPr>
+      <p:grpSpPr>
+        <a:xfrm>
+          <a:off x="0" y="0"/>
+          <a:ext cx="0" cy="0"/>
+          <a:chOff x="0" y="0"/>
+          <a:chExt cx="0" cy="0"/>
+        </a:xfrm>
+      </p:grpSpPr>
+      <p:pic>
+        <p:nvPicPr>
+          <p:cNvPr id="4" name="Picture 3">
+            <a:extLst>
+              <a:ext uri="{FF2B5EF4-FFF2-40B4-BE49-F238E27FC236}">
+                <a16:creationId xmlns:a16="http://schemas.microsoft.com/office/drawing/2014/main" id="{9211FA08-DA52-45F1-A74F-C91F41AF4349}"/>
+              </a:ext>
+            </a:extLst>
+          </p:cNvPr>
+          <p:cNvPicPr>
+            <a:picLocks noChangeAspect="1"/>
+          </p:cNvPicPr>
+          <p:nvPr/>
+        </p:nvPicPr>
+        <p:blipFill>
+          <a:blip r:embed="rId2"/>
+          <a:stretch>
+            <a:fillRect/>
+          </a:stretch>
+        </p:blipFill>
+        <p:spPr>
+          <a:xfrm>
+            <a:off x="4557627" y="1792422"/>
+            <a:ext cx="2690461" cy="2641159"/>
+          </a:xfrm>
+          <a:prstGeom prst="rect">
+            <a:avLst/>
+          </a:prstGeom>
+        </p:spPr>
+      </p:pic>
+    </p:spTree>
+    <p:extLst>
+      <p:ext uri="{BB962C8B-B14F-4D97-AF65-F5344CB8AC3E}">
+        <p14:creationId xmlns:p14="http://schemas.microsoft.com/office/powerpoint/2010/main" val="2884751017"/>
+      </p:ext>
+    </p:extLst>
+  </p:cSld>
+  <p:clrMapOvr>
+    <a:masterClrMapping/>
+  </p:clrMapOvr>
+</p:sld>
+</file>
+
+<file path=ppt/slides/slide22.xml><?xml version="1.0" encoding="utf-8"?>
+<p:sld xmlns:a="http://schemas.openxmlformats.org/drawingml/2006/main" xmlns:r="http://schemas.openxmlformats.org/officeDocument/2006/relationships" xmlns:p="http://schemas.openxmlformats.org/presentationml/2006/main">
+  <p:cSld>
+    <p:spTree>
+      <p:nvGrpSpPr>
+        <p:cNvPr id="1" name=""/>
+        <p:cNvGrpSpPr/>
+        <p:nvPr/>
+      </p:nvGrpSpPr>
+      <p:grpSpPr>
+        <a:xfrm>
+          <a:off x="0" y="0"/>
+          <a:ext cx="0" cy="0"/>
+          <a:chOff x="0" y="0"/>
+          <a:chExt cx="0" cy="0"/>
+        </a:xfrm>
+      </p:grpSpPr>
+      <p:pic>
+        <p:nvPicPr>
+          <p:cNvPr id="4" name="Picture 3">
+            <a:extLst>
+              <a:ext uri="{FF2B5EF4-FFF2-40B4-BE49-F238E27FC236}">
+                <a16:creationId xmlns:a16="http://schemas.microsoft.com/office/drawing/2014/main" id="{0DB84508-8346-49FA-9B80-E0BC5EACA0A9}"/>
+              </a:ext>
+            </a:extLst>
+          </p:cNvPr>
+          <p:cNvPicPr>
+            <a:picLocks noChangeAspect="1"/>
+          </p:cNvPicPr>
+          <p:nvPr/>
+        </p:nvPicPr>
+        <p:blipFill>
+          <a:blip r:embed="rId2"/>
+          <a:stretch>
+            <a:fillRect/>
+          </a:stretch>
+        </p:blipFill>
+        <p:spPr>
+          <a:xfrm>
+            <a:off x="4394060" y="1753300"/>
+            <a:ext cx="2728171" cy="2757988"/>
+          </a:xfrm>
+          <a:prstGeom prst="rect">
+            <a:avLst/>
+          </a:prstGeom>
+        </p:spPr>
+      </p:pic>
+    </p:spTree>
+    <p:extLst>
+      <p:ext uri="{BB962C8B-B14F-4D97-AF65-F5344CB8AC3E}">
+        <p14:creationId xmlns:p14="http://schemas.microsoft.com/office/powerpoint/2010/main" val="644403308"/>
+      </p:ext>
+    </p:extLst>
+  </p:cSld>
+  <p:clrMapOvr>
+    <a:masterClrMapping/>
+  </p:clrMapOvr>
+</p:sld>
+</file>
+
+<file path=ppt/slides/slide23.xml><?xml version="1.0" encoding="utf-8"?>
+<p:sld xmlns:a="http://schemas.openxmlformats.org/drawingml/2006/main" xmlns:r="http://schemas.openxmlformats.org/officeDocument/2006/relationships" xmlns:p="http://schemas.openxmlformats.org/presentationml/2006/main">
+  <p:cSld>
+    <p:spTree>
+      <p:nvGrpSpPr>
+        <p:cNvPr id="1" name=""/>
+        <p:cNvGrpSpPr/>
+        <p:nvPr/>
+      </p:nvGrpSpPr>
+      <p:grpSpPr>
+        <a:xfrm>
+          <a:off x="0" y="0"/>
+          <a:ext cx="0" cy="0"/>
+          <a:chOff x="0" y="0"/>
+          <a:chExt cx="0" cy="0"/>
+        </a:xfrm>
+      </p:grpSpPr>
+      <p:pic>
+        <p:nvPicPr>
+          <p:cNvPr id="4" name="Picture 3">
+            <a:extLst>
+              <a:ext uri="{FF2B5EF4-FFF2-40B4-BE49-F238E27FC236}">
+                <a16:creationId xmlns:a16="http://schemas.microsoft.com/office/drawing/2014/main" id="{E66D8E57-63C2-4C75-8F16-65AF22E36A80}"/>
+              </a:ext>
+            </a:extLst>
+          </p:cNvPr>
+          <p:cNvPicPr>
+            <a:picLocks noChangeAspect="1"/>
+          </p:cNvPicPr>
+          <p:nvPr/>
+        </p:nvPicPr>
+        <p:blipFill>
+          <a:blip r:embed="rId2"/>
+          <a:stretch>
+            <a:fillRect/>
+          </a:stretch>
+        </p:blipFill>
+        <p:spPr>
+          <a:xfrm>
+            <a:off x="4469146" y="1886854"/>
+            <a:ext cx="2661496" cy="2647395"/>
+          </a:xfrm>
+          <a:prstGeom prst="rect">
+            <a:avLst/>
+          </a:prstGeom>
+        </p:spPr>
+      </p:pic>
+    </p:spTree>
+    <p:extLst>
+      <p:ext uri="{BB962C8B-B14F-4D97-AF65-F5344CB8AC3E}">
+        <p14:creationId xmlns:p14="http://schemas.microsoft.com/office/powerpoint/2010/main" val="516503834"/>
+      </p:ext>
+    </p:extLst>
+  </p:cSld>
+  <p:clrMapOvr>
+    <a:masterClrMapping/>
+  </p:clrMapOvr>
+</p:sld>
+</file>
+
+<file path=ppt/slides/slide24.xml><?xml version="1.0" encoding="utf-8"?>
+<p:sld xmlns:a="http://schemas.openxmlformats.org/drawingml/2006/main" xmlns:r="http://schemas.openxmlformats.org/officeDocument/2006/relationships" xmlns:p="http://schemas.openxmlformats.org/presentationml/2006/main">
+  <p:cSld>
+    <p:spTree>
+      <p:nvGrpSpPr>
+        <p:cNvPr id="1" name=""/>
+        <p:cNvGrpSpPr/>
+        <p:nvPr/>
+      </p:nvGrpSpPr>
+      <p:grpSpPr>
+        <a:xfrm>
+          <a:off x="0" y="0"/>
+          <a:ext cx="0" cy="0"/>
+          <a:chOff x="0" y="0"/>
+          <a:chExt cx="0" cy="0"/>
+        </a:xfrm>
+      </p:grpSpPr>
+      <p:pic>
+        <p:nvPicPr>
+          <p:cNvPr id="4" name="Picture 3">
+            <a:extLst>
+              <a:ext uri="{FF2B5EF4-FFF2-40B4-BE49-F238E27FC236}">
+                <a16:creationId xmlns:a16="http://schemas.microsoft.com/office/drawing/2014/main" id="{D3588E81-5BFD-4BAA-B09A-3D497D4D7C51}"/>
+              </a:ext>
+            </a:extLst>
+          </p:cNvPr>
+          <p:cNvPicPr>
+            <a:picLocks noChangeAspect="1"/>
+          </p:cNvPicPr>
+          <p:nvPr/>
+        </p:nvPicPr>
+        <p:blipFill>
+          <a:blip r:embed="rId2"/>
+          <a:stretch>
+            <a:fillRect/>
+          </a:stretch>
+        </p:blipFill>
+        <p:spPr>
+          <a:xfrm>
+            <a:off x="4510995" y="1903654"/>
+            <a:ext cx="2669982" cy="2655761"/>
+          </a:xfrm>
+          <a:prstGeom prst="rect">
+            <a:avLst/>
+          </a:prstGeom>
+        </p:spPr>
+      </p:pic>
+    </p:spTree>
+    <p:extLst>
+      <p:ext uri="{BB962C8B-B14F-4D97-AF65-F5344CB8AC3E}">
+        <p14:creationId xmlns:p14="http://schemas.microsoft.com/office/powerpoint/2010/main" val="1821872603"/>
+      </p:ext>
+    </p:extLst>
+  </p:cSld>
+  <p:clrMapOvr>
+    <a:masterClrMapping/>
+  </p:clrMapOvr>
+</p:sld>
+</file>
+
+<file path=ppt/slides/slide25.xml><?xml version="1.0" encoding="utf-8"?>
+<p:sld xmlns:a="http://schemas.openxmlformats.org/drawingml/2006/main" xmlns:r="http://schemas.openxmlformats.org/officeDocument/2006/relationships" xmlns:p="http://schemas.openxmlformats.org/presentationml/2006/main">
+  <p:cSld>
+    <p:spTree>
+      <p:nvGrpSpPr>
+        <p:cNvPr id="1" name=""/>
+        <p:cNvGrpSpPr/>
+        <p:nvPr/>
+      </p:nvGrpSpPr>
+      <p:grpSpPr>
+        <a:xfrm>
+          <a:off x="0" y="0"/>
+          <a:ext cx="0" cy="0"/>
+          <a:chOff x="0" y="0"/>
+          <a:chExt cx="0" cy="0"/>
+        </a:xfrm>
+      </p:grpSpPr>
+      <p:pic>
+        <p:nvPicPr>
+          <p:cNvPr id="4" name="Picture 3">
+            <a:extLst>
+              <a:ext uri="{FF2B5EF4-FFF2-40B4-BE49-F238E27FC236}">
+                <a16:creationId xmlns:a16="http://schemas.microsoft.com/office/drawing/2014/main" id="{32817BB1-CC2A-4DC5-987E-A47F9D9AE0D8}"/>
+              </a:ext>
+            </a:extLst>
+          </p:cNvPr>
+          <p:cNvPicPr>
+            <a:picLocks noChangeAspect="1"/>
+          </p:cNvPicPr>
+          <p:nvPr/>
+        </p:nvPicPr>
+        <p:blipFill>
+          <a:blip r:embed="rId2"/>
+          <a:stretch>
+            <a:fillRect/>
+          </a:stretch>
+        </p:blipFill>
+        <p:spPr>
+          <a:xfrm>
+            <a:off x="4725384" y="1930203"/>
+            <a:ext cx="2749208" cy="2738270"/>
+          </a:xfrm>
+          <a:prstGeom prst="rect">
+            <a:avLst/>
+          </a:prstGeom>
+        </p:spPr>
+      </p:pic>
+    </p:spTree>
+    <p:extLst>
+      <p:ext uri="{BB962C8B-B14F-4D97-AF65-F5344CB8AC3E}">
+        <p14:creationId xmlns:p14="http://schemas.microsoft.com/office/powerpoint/2010/main" val="1181846426"/>
+      </p:ext>
+    </p:extLst>
+  </p:cSld>
+  <p:clrMapOvr>
+    <a:masterClrMapping/>
+  </p:clrMapOvr>
+</p:sld>
+</file>
+
+<file path=ppt/slides/slide26.xml><?xml version="1.0" encoding="utf-8"?>
+<p:sld xmlns:a="http://schemas.openxmlformats.org/drawingml/2006/main" xmlns:r="http://schemas.openxmlformats.org/officeDocument/2006/relationships" xmlns:p="http://schemas.openxmlformats.org/presentationml/2006/main">
+  <p:cSld>
+    <p:spTree>
+      <p:nvGrpSpPr>
+        <p:cNvPr id="1" name=""/>
+        <p:cNvGrpSpPr/>
+        <p:nvPr/>
+      </p:nvGrpSpPr>
+      <p:grpSpPr>
+        <a:xfrm>
+          <a:off x="0" y="0"/>
+          <a:ext cx="0" cy="0"/>
+          <a:chOff x="0" y="0"/>
+          <a:chExt cx="0" cy="0"/>
+        </a:xfrm>
+      </p:grpSpPr>
+      <p:pic>
+        <p:nvPicPr>
+          <p:cNvPr id="4" name="Picture 3">
+            <a:extLst>
+              <a:ext uri="{FF2B5EF4-FFF2-40B4-BE49-F238E27FC236}">
+                <a16:creationId xmlns:a16="http://schemas.microsoft.com/office/drawing/2014/main" id="{A636C9F9-D371-431F-AF00-50A1323B1430}"/>
+              </a:ext>
+            </a:extLst>
+          </p:cNvPr>
+          <p:cNvPicPr>
+            <a:picLocks noChangeAspect="1"/>
+          </p:cNvPicPr>
+          <p:nvPr/>
+        </p:nvPicPr>
+        <p:blipFill>
+          <a:blip r:embed="rId2"/>
+          <a:stretch>
+            <a:fillRect/>
+          </a:stretch>
+        </p:blipFill>
+        <p:spPr>
+          <a:xfrm>
+            <a:off x="4505627" y="1683787"/>
+            <a:ext cx="2943798" cy="2959519"/>
+          </a:xfrm>
+          <a:prstGeom prst="rect">
+            <a:avLst/>
+          </a:prstGeom>
+        </p:spPr>
+      </p:pic>
+    </p:spTree>
+    <p:extLst>
+      <p:ext uri="{BB962C8B-B14F-4D97-AF65-F5344CB8AC3E}">
+        <p14:creationId xmlns:p14="http://schemas.microsoft.com/office/powerpoint/2010/main" val="3808254785"/>
+      </p:ext>
+    </p:extLst>
+  </p:cSld>
+  <p:clrMapOvr>
+    <a:masterClrMapping/>
+  </p:clrMapOvr>
+</p:sld>
+</file>
+
+<file path=ppt/slides/slide27.xml><?xml version="1.0" encoding="utf-8"?>
+<p:sld xmlns:a="http://schemas.openxmlformats.org/drawingml/2006/main" xmlns:r="http://schemas.openxmlformats.org/officeDocument/2006/relationships" xmlns:p="http://schemas.openxmlformats.org/presentationml/2006/main">
+  <p:cSld>
+    <p:spTree>
+      <p:nvGrpSpPr>
+        <p:cNvPr id="1" name=""/>
+        <p:cNvGrpSpPr/>
+        <p:nvPr/>
+      </p:nvGrpSpPr>
+      <p:grpSpPr>
+        <a:xfrm>
+          <a:off x="0" y="0"/>
+          <a:ext cx="0" cy="0"/>
+          <a:chOff x="0" y="0"/>
+          <a:chExt cx="0" cy="0"/>
+        </a:xfrm>
+      </p:grpSpPr>
+      <p:pic>
+        <p:nvPicPr>
+          <p:cNvPr id="4" name="Picture 3">
+            <a:extLst>
+              <a:ext uri="{FF2B5EF4-FFF2-40B4-BE49-F238E27FC236}">
+                <a16:creationId xmlns:a16="http://schemas.microsoft.com/office/drawing/2014/main" id="{823A9694-8BA0-4E6B-8BF3-3C385C6BA532}"/>
+              </a:ext>
+            </a:extLst>
+          </p:cNvPr>
+          <p:cNvPicPr>
+            <a:picLocks noChangeAspect="1"/>
+          </p:cNvPicPr>
+          <p:nvPr/>
+        </p:nvPicPr>
+        <p:blipFill>
+          <a:blip r:embed="rId2"/>
+          <a:stretch>
+            <a:fillRect/>
+          </a:stretch>
+        </p:blipFill>
+        <p:spPr>
+          <a:xfrm>
+            <a:off x="4454555" y="1757147"/>
+            <a:ext cx="3020036" cy="3011994"/>
+          </a:xfrm>
+          <a:prstGeom prst="rect">
+            <a:avLst/>
+          </a:prstGeom>
+        </p:spPr>
+      </p:pic>
+    </p:spTree>
+    <p:extLst>
+      <p:ext uri="{BB962C8B-B14F-4D97-AF65-F5344CB8AC3E}">
+        <p14:creationId xmlns:p14="http://schemas.microsoft.com/office/powerpoint/2010/main" val="3965224367"/>
+      </p:ext>
+    </p:extLst>
+  </p:cSld>
+  <p:clrMapOvr>
+    <a:masterClrMapping/>
+  </p:clrMapOvr>
+</p:sld>
+</file>
+
+<file path=ppt/slides/slide28.xml><?xml version="1.0" encoding="utf-8"?>
+<p:sld xmlns:a="http://schemas.openxmlformats.org/drawingml/2006/main" xmlns:r="http://schemas.openxmlformats.org/officeDocument/2006/relationships" xmlns:p="http://schemas.openxmlformats.org/presentationml/2006/main">
+  <p:cSld>
+    <p:spTree>
+      <p:nvGrpSpPr>
+        <p:cNvPr id="1" name=""/>
+        <p:cNvGrpSpPr/>
+        <p:nvPr/>
+      </p:nvGrpSpPr>
+      <p:grpSpPr>
+        <a:xfrm>
+          <a:off x="0" y="0"/>
+          <a:ext cx="0" cy="0"/>
+          <a:chOff x="0" y="0"/>
+          <a:chExt cx="0" cy="0"/>
+        </a:xfrm>
+      </p:grpSpPr>
+      <p:pic>
+        <p:nvPicPr>
+          <p:cNvPr id="4" name="Picture 3">
+            <a:extLst>
+              <a:ext uri="{FF2B5EF4-FFF2-40B4-BE49-F238E27FC236}">
+                <a16:creationId xmlns:a16="http://schemas.microsoft.com/office/drawing/2014/main" id="{09DB0EAC-D4A9-4F8E-ABBC-77881F205507}"/>
+              </a:ext>
+            </a:extLst>
+          </p:cNvPr>
+          <p:cNvPicPr>
+            <a:picLocks noChangeAspect="1"/>
+          </p:cNvPicPr>
+          <p:nvPr/>
+        </p:nvPicPr>
+        <p:blipFill>
+          <a:blip r:embed="rId2"/>
+          <a:stretch>
+            <a:fillRect/>
+          </a:stretch>
+        </p:blipFill>
+        <p:spPr>
+          <a:xfrm>
+            <a:off x="4496499" y="1837888"/>
+            <a:ext cx="2981588" cy="2981588"/>
+          </a:xfrm>
+          <a:prstGeom prst="rect">
+            <a:avLst/>
+          </a:prstGeom>
+        </p:spPr>
+      </p:pic>
+    </p:spTree>
+    <p:extLst>
+      <p:ext uri="{BB962C8B-B14F-4D97-AF65-F5344CB8AC3E}">
+        <p14:creationId xmlns:p14="http://schemas.microsoft.com/office/powerpoint/2010/main" val="3835567959"/>
+      </p:ext>
+    </p:extLst>
+  </p:cSld>
+  <p:clrMapOvr>
+    <a:masterClrMapping/>
+  </p:clrMapOvr>
+</p:sld>
+</file>
+
+<file path=ppt/slides/slide29.xml><?xml version="1.0" encoding="utf-8"?>
+<p:sld xmlns:a="http://schemas.openxmlformats.org/drawingml/2006/main" xmlns:r="http://schemas.openxmlformats.org/officeDocument/2006/relationships" xmlns:p="http://schemas.openxmlformats.org/presentationml/2006/main">
+  <p:cSld>
+    <p:spTree>
+      <p:nvGrpSpPr>
+        <p:cNvPr id="1" name=""/>
+        <p:cNvGrpSpPr/>
+        <p:nvPr/>
+      </p:nvGrpSpPr>
+      <p:grpSpPr>
+        <a:xfrm>
+          <a:off x="0" y="0"/>
+          <a:ext cx="0" cy="0"/>
+          <a:chOff x="0" y="0"/>
+          <a:chExt cx="0" cy="0"/>
+        </a:xfrm>
+      </p:grpSpPr>
+      <p:pic>
+        <p:nvPicPr>
+          <p:cNvPr id="4" name="Picture 3">
+            <a:extLst>
+              <a:ext uri="{FF2B5EF4-FFF2-40B4-BE49-F238E27FC236}">
+                <a16:creationId xmlns:a16="http://schemas.microsoft.com/office/drawing/2014/main" id="{6CEE42C2-3928-4E2C-8B86-A1F18AD9077F}"/>
+              </a:ext>
+            </a:extLst>
+          </p:cNvPr>
+          <p:cNvPicPr>
+            <a:picLocks noChangeAspect="1"/>
+          </p:cNvPicPr>
+          <p:nvPr/>
+        </p:nvPicPr>
+        <p:blipFill>
+          <a:blip r:embed="rId2"/>
+          <a:stretch>
+            <a:fillRect/>
+          </a:stretch>
+        </p:blipFill>
+        <p:spPr>
+          <a:xfrm>
+            <a:off x="4421688" y="1702964"/>
+            <a:ext cx="3024898" cy="3041009"/>
+          </a:xfrm>
+          <a:prstGeom prst="rect">
+            <a:avLst/>
+          </a:prstGeom>
+        </p:spPr>
+      </p:pic>
+    </p:spTree>
+    <p:extLst>
+      <p:ext uri="{BB962C8B-B14F-4D97-AF65-F5344CB8AC3E}">
+        <p14:creationId xmlns:p14="http://schemas.microsoft.com/office/powerpoint/2010/main" val="108913384"/>
       </p:ext>
     </p:extLst>
   </p:cSld>
@@ -3603,6 +4763,66 @@
     <p:extLst>
       <p:ext uri="{BB962C8B-B14F-4D97-AF65-F5344CB8AC3E}">
         <p14:creationId xmlns:p14="http://schemas.microsoft.com/office/powerpoint/2010/main" val="1203342261"/>
+      </p:ext>
+    </p:extLst>
+  </p:cSld>
+  <p:clrMapOvr>
+    <a:masterClrMapping/>
+  </p:clrMapOvr>
+</p:sld>
+</file>
+
+<file path=ppt/slides/slide30.xml><?xml version="1.0" encoding="utf-8"?>
+<p:sld xmlns:a="http://schemas.openxmlformats.org/drawingml/2006/main" xmlns:r="http://schemas.openxmlformats.org/officeDocument/2006/relationships" xmlns:p="http://schemas.openxmlformats.org/presentationml/2006/main">
+  <p:cSld>
+    <p:spTree>
+      <p:nvGrpSpPr>
+        <p:cNvPr id="1" name=""/>
+        <p:cNvGrpSpPr/>
+        <p:nvPr/>
+      </p:nvGrpSpPr>
+      <p:grpSpPr>
+        <a:xfrm>
+          <a:off x="0" y="0"/>
+          <a:ext cx="0" cy="0"/>
+          <a:chOff x="0" y="0"/>
+          <a:chExt cx="0" cy="0"/>
+        </a:xfrm>
+      </p:grpSpPr>
+      <p:pic>
+        <p:nvPicPr>
+          <p:cNvPr id="4" name="Picture 3">
+            <a:extLst>
+              <a:ext uri="{FF2B5EF4-FFF2-40B4-BE49-F238E27FC236}">
+                <a16:creationId xmlns:a16="http://schemas.microsoft.com/office/drawing/2014/main" id="{086E005E-9D85-49FF-99CB-E47A85BBA355}"/>
+              </a:ext>
+            </a:extLst>
+          </p:cNvPr>
+          <p:cNvPicPr>
+            <a:picLocks noChangeAspect="1"/>
+          </p:cNvPicPr>
+          <p:nvPr/>
+        </p:nvPicPr>
+        <p:blipFill>
+          <a:blip r:embed="rId2"/>
+          <a:stretch>
+            <a:fillRect/>
+          </a:stretch>
+        </p:blipFill>
+        <p:spPr>
+          <a:xfrm>
+            <a:off x="4202940" y="1682453"/>
+            <a:ext cx="2986425" cy="2994410"/>
+          </a:xfrm>
+          <a:prstGeom prst="rect">
+            <a:avLst/>
+          </a:prstGeom>
+        </p:spPr>
+      </p:pic>
+    </p:spTree>
+    <p:extLst>
+      <p:ext uri="{BB962C8B-B14F-4D97-AF65-F5344CB8AC3E}">
+        <p14:creationId xmlns:p14="http://schemas.microsoft.com/office/powerpoint/2010/main" val="125623825"/>
       </p:ext>
     </p:extLst>
   </p:cSld>

</xml_diff>

<commit_message>
still working on test 354 - Slide Deck Upload - change slide location
</commit_message>
<xml_diff>
--- a/web/media/ppt/timelineQRCode.pptx
+++ b/web/media/ppt/timelineQRCode.pptx
@@ -292,7 +292,7 @@
           <a:p>
             <a:fld id="{3ABE52FA-3C23-44BD-B501-603726A78153}" type="datetimeFigureOut">
               <a:rPr lang="en-US" smtClean="0"/>
-              <a:t>19-02-18</a:t>
+              <a:t>08-03-18</a:t>
             </a:fld>
             <a:endParaRPr lang="en-US"/>
           </a:p>
@@ -490,7 +490,7 @@
           <a:p>
             <a:fld id="{3ABE52FA-3C23-44BD-B501-603726A78153}" type="datetimeFigureOut">
               <a:rPr lang="en-US" smtClean="0"/>
-              <a:t>19-02-18</a:t>
+              <a:t>08-03-18</a:t>
             </a:fld>
             <a:endParaRPr lang="en-US"/>
           </a:p>
@@ -698,7 +698,7 @@
           <a:p>
             <a:fld id="{3ABE52FA-3C23-44BD-B501-603726A78153}" type="datetimeFigureOut">
               <a:rPr lang="en-US" smtClean="0"/>
-              <a:t>19-02-18</a:t>
+              <a:t>08-03-18</a:t>
             </a:fld>
             <a:endParaRPr lang="en-US"/>
           </a:p>
@@ -896,7 +896,7 @@
           <a:p>
             <a:fld id="{3ABE52FA-3C23-44BD-B501-603726A78153}" type="datetimeFigureOut">
               <a:rPr lang="en-US" smtClean="0"/>
-              <a:t>19-02-18</a:t>
+              <a:t>08-03-18</a:t>
             </a:fld>
             <a:endParaRPr lang="en-US"/>
           </a:p>
@@ -1171,7 +1171,7 @@
           <a:p>
             <a:fld id="{3ABE52FA-3C23-44BD-B501-603726A78153}" type="datetimeFigureOut">
               <a:rPr lang="en-US" smtClean="0"/>
-              <a:t>19-02-18</a:t>
+              <a:t>08-03-18</a:t>
             </a:fld>
             <a:endParaRPr lang="en-US"/>
           </a:p>
@@ -1436,7 +1436,7 @@
           <a:p>
             <a:fld id="{3ABE52FA-3C23-44BD-B501-603726A78153}" type="datetimeFigureOut">
               <a:rPr lang="en-US" smtClean="0"/>
-              <a:t>19-02-18</a:t>
+              <a:t>08-03-18</a:t>
             </a:fld>
             <a:endParaRPr lang="en-US"/>
           </a:p>
@@ -1848,7 +1848,7 @@
           <a:p>
             <a:fld id="{3ABE52FA-3C23-44BD-B501-603726A78153}" type="datetimeFigureOut">
               <a:rPr lang="en-US" smtClean="0"/>
-              <a:t>19-02-18</a:t>
+              <a:t>08-03-18</a:t>
             </a:fld>
             <a:endParaRPr lang="en-US"/>
           </a:p>
@@ -1989,7 +1989,7 @@
           <a:p>
             <a:fld id="{3ABE52FA-3C23-44BD-B501-603726A78153}" type="datetimeFigureOut">
               <a:rPr lang="en-US" smtClean="0"/>
-              <a:t>19-02-18</a:t>
+              <a:t>08-03-18</a:t>
             </a:fld>
             <a:endParaRPr lang="en-US"/>
           </a:p>
@@ -2102,7 +2102,7 @@
           <a:p>
             <a:fld id="{3ABE52FA-3C23-44BD-B501-603726A78153}" type="datetimeFigureOut">
               <a:rPr lang="en-US" smtClean="0"/>
-              <a:t>19-02-18</a:t>
+              <a:t>08-03-18</a:t>
             </a:fld>
             <a:endParaRPr lang="en-US"/>
           </a:p>
@@ -2413,7 +2413,7 @@
           <a:p>
             <a:fld id="{3ABE52FA-3C23-44BD-B501-603726A78153}" type="datetimeFigureOut">
               <a:rPr lang="en-US" smtClean="0"/>
-              <a:t>19-02-18</a:t>
+              <a:t>08-03-18</a:t>
             </a:fld>
             <a:endParaRPr lang="en-US"/>
           </a:p>
@@ -2701,7 +2701,7 @@
           <a:p>
             <a:fld id="{3ABE52FA-3C23-44BD-B501-603726A78153}" type="datetimeFigureOut">
               <a:rPr lang="en-US" smtClean="0"/>
-              <a:t>19-02-18</a:t>
+              <a:t>08-03-18</a:t>
             </a:fld>
             <a:endParaRPr lang="en-US"/>
           </a:p>
@@ -2942,7 +2942,7 @@
           <a:p>
             <a:fld id="{3ABE52FA-3C23-44BD-B501-603726A78153}" type="datetimeFigureOut">
               <a:rPr lang="en-US" smtClean="0"/>
-              <a:t>19-02-18</a:t>
+              <a:t>08-03-18</a:t>
             </a:fld>
             <a:endParaRPr lang="en-US"/>
           </a:p>
@@ -4794,7 +4794,7 @@
           <p:cNvPr id="4" name="Picture 3">
             <a:extLst>
               <a:ext uri="{FF2B5EF4-FFF2-40B4-BE49-F238E27FC236}">
-                <a16:creationId xmlns:a16="http://schemas.microsoft.com/office/drawing/2014/main" id="{086E005E-9D85-49FF-99CB-E47A85BBA355}"/>
+                <a16:creationId xmlns:a16="http://schemas.microsoft.com/office/drawing/2014/main" id="{216EDB11-AACA-4CFA-B321-3972AD28C33E}"/>
               </a:ext>
             </a:extLst>
           </p:cNvPr>
@@ -4811,8 +4811,8 @@
         </p:blipFill>
         <p:spPr>
           <a:xfrm>
-            <a:off x="4202940" y="1682453"/>
-            <a:ext cx="2986425" cy="2994410"/>
+            <a:off x="4421688" y="1702964"/>
+            <a:ext cx="3024898" cy="3041009"/>
           </a:xfrm>
           <a:prstGeom prst="rect">
             <a:avLst/>
@@ -4822,7 +4822,7 @@
     </p:spTree>
     <p:extLst>
       <p:ext uri="{BB962C8B-B14F-4D97-AF65-F5344CB8AC3E}">
-        <p14:creationId xmlns:p14="http://schemas.microsoft.com/office/powerpoint/2010/main" val="125623825"/>
+        <p14:creationId xmlns:p14="http://schemas.microsoft.com/office/powerpoint/2010/main" val="2321157194"/>
       </p:ext>
     </p:extLst>
   </p:cSld>

</xml_diff>

<commit_message>
change test 354 flow change function clear_and_send_keys in base added and change functin in  player : verifyslidesThatChangedLocationInTimeLine, checkSlidesTimeInSlideBarMenu
</commit_message>
<xml_diff>
--- a/web/media/ppt/timelineQRCode.pptx
+++ b/web/media/ppt/timelineQRCode.pptx
@@ -292,7 +292,7 @@
           <a:p>
             <a:fld id="{3ABE52FA-3C23-44BD-B501-603726A78153}" type="datetimeFigureOut">
               <a:rPr lang="en-US" smtClean="0"/>
-              <a:t>08-03-18</a:t>
+              <a:t>12-03-18</a:t>
             </a:fld>
             <a:endParaRPr lang="en-US"/>
           </a:p>
@@ -490,7 +490,7 @@
           <a:p>
             <a:fld id="{3ABE52FA-3C23-44BD-B501-603726A78153}" type="datetimeFigureOut">
               <a:rPr lang="en-US" smtClean="0"/>
-              <a:t>08-03-18</a:t>
+              <a:t>12-03-18</a:t>
             </a:fld>
             <a:endParaRPr lang="en-US"/>
           </a:p>
@@ -698,7 +698,7 @@
           <a:p>
             <a:fld id="{3ABE52FA-3C23-44BD-B501-603726A78153}" type="datetimeFigureOut">
               <a:rPr lang="en-US" smtClean="0"/>
-              <a:t>08-03-18</a:t>
+              <a:t>12-03-18</a:t>
             </a:fld>
             <a:endParaRPr lang="en-US"/>
           </a:p>
@@ -896,7 +896,7 @@
           <a:p>
             <a:fld id="{3ABE52FA-3C23-44BD-B501-603726A78153}" type="datetimeFigureOut">
               <a:rPr lang="en-US" smtClean="0"/>
-              <a:t>08-03-18</a:t>
+              <a:t>12-03-18</a:t>
             </a:fld>
             <a:endParaRPr lang="en-US"/>
           </a:p>
@@ -1171,7 +1171,7 @@
           <a:p>
             <a:fld id="{3ABE52FA-3C23-44BD-B501-603726A78153}" type="datetimeFigureOut">
               <a:rPr lang="en-US" smtClean="0"/>
-              <a:t>08-03-18</a:t>
+              <a:t>12-03-18</a:t>
             </a:fld>
             <a:endParaRPr lang="en-US"/>
           </a:p>
@@ -1436,7 +1436,7 @@
           <a:p>
             <a:fld id="{3ABE52FA-3C23-44BD-B501-603726A78153}" type="datetimeFigureOut">
               <a:rPr lang="en-US" smtClean="0"/>
-              <a:t>08-03-18</a:t>
+              <a:t>12-03-18</a:t>
             </a:fld>
             <a:endParaRPr lang="en-US"/>
           </a:p>
@@ -1848,7 +1848,7 @@
           <a:p>
             <a:fld id="{3ABE52FA-3C23-44BD-B501-603726A78153}" type="datetimeFigureOut">
               <a:rPr lang="en-US" smtClean="0"/>
-              <a:t>08-03-18</a:t>
+              <a:t>12-03-18</a:t>
             </a:fld>
             <a:endParaRPr lang="en-US"/>
           </a:p>
@@ -1989,7 +1989,7 @@
           <a:p>
             <a:fld id="{3ABE52FA-3C23-44BD-B501-603726A78153}" type="datetimeFigureOut">
               <a:rPr lang="en-US" smtClean="0"/>
-              <a:t>08-03-18</a:t>
+              <a:t>12-03-18</a:t>
             </a:fld>
             <a:endParaRPr lang="en-US"/>
           </a:p>
@@ -2102,7 +2102,7 @@
           <a:p>
             <a:fld id="{3ABE52FA-3C23-44BD-B501-603726A78153}" type="datetimeFigureOut">
               <a:rPr lang="en-US" smtClean="0"/>
-              <a:t>08-03-18</a:t>
+              <a:t>12-03-18</a:t>
             </a:fld>
             <a:endParaRPr lang="en-US"/>
           </a:p>
@@ -2413,7 +2413,7 @@
           <a:p>
             <a:fld id="{3ABE52FA-3C23-44BD-B501-603726A78153}" type="datetimeFigureOut">
               <a:rPr lang="en-US" smtClean="0"/>
-              <a:t>08-03-18</a:t>
+              <a:t>12-03-18</a:t>
             </a:fld>
             <a:endParaRPr lang="en-US"/>
           </a:p>
@@ -2701,7 +2701,7 @@
           <a:p>
             <a:fld id="{3ABE52FA-3C23-44BD-B501-603726A78153}" type="datetimeFigureOut">
               <a:rPr lang="en-US" smtClean="0"/>
-              <a:t>08-03-18</a:t>
+              <a:t>12-03-18</a:t>
             </a:fld>
             <a:endParaRPr lang="en-US"/>
           </a:p>
@@ -2942,7 +2942,7 @@
           <a:p>
             <a:fld id="{3ABE52FA-3C23-44BD-B501-603726A78153}" type="datetimeFigureOut">
               <a:rPr lang="en-US" smtClean="0"/>
-              <a:t>08-03-18</a:t>
+              <a:t>12-03-18</a:t>
             </a:fld>
             <a:endParaRPr lang="en-US"/>
           </a:p>
@@ -3381,8 +3381,8 @@
         </p:blipFill>
         <p:spPr>
           <a:xfrm>
-            <a:off x="4706223" y="2202024"/>
-            <a:ext cx="2664961" cy="2528187"/>
+            <a:off x="3254928" y="881840"/>
+            <a:ext cx="5382993" cy="5106721"/>
           </a:xfrm>
           <a:prstGeom prst="rect">
             <a:avLst/>
@@ -3447,8 +3447,8 @@
         </p:blipFill>
         <p:spPr>
           <a:xfrm>
-            <a:off x="4236099" y="1482455"/>
-            <a:ext cx="3526971" cy="3526971"/>
+            <a:off x="2457975" y="90224"/>
+            <a:ext cx="6622168" cy="6622168"/>
           </a:xfrm>
           <a:prstGeom prst="rect">
             <a:avLst/>
@@ -3507,8 +3507,8 @@
         </p:blipFill>
         <p:spPr>
           <a:xfrm>
-            <a:off x="4014172" y="1599000"/>
-            <a:ext cx="3586253" cy="3530867"/>
+            <a:off x="2718033" y="327219"/>
+            <a:ext cx="6249797" cy="6153275"/>
           </a:xfrm>
           <a:prstGeom prst="rect">
             <a:avLst/>
@@ -3567,8 +3567,8 @@
         </p:blipFill>
         <p:spPr>
           <a:xfrm>
-            <a:off x="4127238" y="1669409"/>
-            <a:ext cx="3468168" cy="3477236"/>
+            <a:off x="2449586" y="219346"/>
+            <a:ext cx="6261556" cy="6277928"/>
           </a:xfrm>
           <a:prstGeom prst="rect">
             <a:avLst/>
@@ -3627,8 +3627,8 @@
         </p:blipFill>
         <p:spPr>
           <a:xfrm>
-            <a:off x="4092410" y="1723268"/>
-            <a:ext cx="3449294" cy="3440156"/>
+            <a:off x="2650921" y="330765"/>
+            <a:ext cx="6107187" cy="6091008"/>
           </a:xfrm>
           <a:prstGeom prst="rect">
             <a:avLst/>
@@ -3687,8 +3687,8 @@
         </p:blipFill>
         <p:spPr>
           <a:xfrm>
-            <a:off x="4202953" y="1690100"/>
-            <a:ext cx="3263250" cy="3271987"/>
+            <a:off x="2592198" y="390535"/>
+            <a:ext cx="6098797" cy="6115127"/>
           </a:xfrm>
           <a:prstGeom prst="rect">
             <a:avLst/>
@@ -3747,8 +3747,8 @@
         </p:blipFill>
         <p:spPr>
           <a:xfrm>
-            <a:off x="4243602" y="1718711"/>
-            <a:ext cx="3147100" cy="3201432"/>
+            <a:off x="2726422" y="419164"/>
+            <a:ext cx="6090409" cy="6195555"/>
           </a:xfrm>
           <a:prstGeom prst="rect">
             <a:avLst/>
@@ -3807,8 +3807,8 @@
         </p:blipFill>
         <p:spPr>
           <a:xfrm>
-            <a:off x="4367387" y="1795244"/>
-            <a:ext cx="2995975" cy="3015842"/>
+            <a:off x="2650921" y="292551"/>
+            <a:ext cx="6180516" cy="6221500"/>
           </a:xfrm>
           <a:prstGeom prst="rect">
             <a:avLst/>
@@ -3867,8 +3867,8 @@
         </p:blipFill>
         <p:spPr>
           <a:xfrm>
-            <a:off x="4298287" y="1764429"/>
-            <a:ext cx="2865911" cy="2862100"/>
+            <a:off x="2659309" y="423132"/>
+            <a:ext cx="5922627" cy="5914751"/>
           </a:xfrm>
           <a:prstGeom prst="rect">
             <a:avLst/>
@@ -3927,8 +3927,8 @@
         </p:blipFill>
         <p:spPr>
           <a:xfrm>
-            <a:off x="4273176" y="1635853"/>
-            <a:ext cx="3034212" cy="3082954"/>
+            <a:off x="2516698" y="384885"/>
+            <a:ext cx="6032262" cy="6129165"/>
           </a:xfrm>
           <a:prstGeom prst="rect">
             <a:avLst/>
@@ -3987,8 +3987,8 @@
         </p:blipFill>
         <p:spPr>
           <a:xfrm>
-            <a:off x="4668834" y="1818321"/>
-            <a:ext cx="2713478" cy="2724317"/>
+            <a:off x="2390863" y="247645"/>
+            <a:ext cx="6258186" cy="6283184"/>
           </a:xfrm>
           <a:prstGeom prst="rect">
             <a:avLst/>
@@ -4027,10 +4027,10 @@
       </p:grpSpPr>
       <p:pic>
         <p:nvPicPr>
-          <p:cNvPr id="4" name="Picture 3">
-            <a:extLst>
-              <a:ext uri="{FF2B5EF4-FFF2-40B4-BE49-F238E27FC236}">
-                <a16:creationId xmlns:a16="http://schemas.microsoft.com/office/drawing/2014/main" id="{2B9EE999-9159-4DC8-874F-23901DD0B4CF}"/>
+          <p:cNvPr id="2" name="Picture 1">
+            <a:extLst>
+              <a:ext uri="{FF2B5EF4-FFF2-40B4-BE49-F238E27FC236}">
+                <a16:creationId xmlns:a16="http://schemas.microsoft.com/office/drawing/2014/main" id="{310CCE2D-76B2-4DB8-89B8-D4F595745E02}"/>
               </a:ext>
             </a:extLst>
           </p:cNvPr>
@@ -4040,21 +4040,15 @@
           <p:nvPr/>
         </p:nvPicPr>
         <p:blipFill>
-          <a:blip r:embed="rId2">
-            <a:extLst>
-              <a:ext uri="{28A0092B-C50C-407E-A947-70E740481C1C}">
-                <a14:useLocalDpi xmlns:a14="http://schemas.microsoft.com/office/drawing/2010/main" val="0"/>
-              </a:ext>
-            </a:extLst>
-          </a:blip>
+          <a:blip r:embed="rId2"/>
           <a:stretch>
             <a:fillRect/>
           </a:stretch>
         </p:blipFill>
         <p:spPr>
           <a:xfrm>
-            <a:off x="3093216" y="1287041"/>
-            <a:ext cx="5790330" cy="4917233"/>
+            <a:off x="2877424" y="754596"/>
+            <a:ext cx="5603977" cy="4886302"/>
           </a:xfrm>
           <a:prstGeom prst="rect">
             <a:avLst/>
@@ -4113,8 +4107,8 @@
         </p:blipFill>
         <p:spPr>
           <a:xfrm>
-            <a:off x="4747470" y="1899407"/>
-            <a:ext cx="2693565" cy="2693565"/>
+            <a:off x="2499919" y="314587"/>
+            <a:ext cx="6224631" cy="6224631"/>
           </a:xfrm>
           <a:prstGeom prst="rect">
             <a:avLst/>
@@ -4173,8 +4167,8 @@
         </p:blipFill>
         <p:spPr>
           <a:xfrm>
-            <a:off x="4557627" y="1792422"/>
-            <a:ext cx="2690461" cy="2641159"/>
+            <a:off x="2659310" y="380009"/>
+            <a:ext cx="6316911" cy="6201155"/>
           </a:xfrm>
           <a:prstGeom prst="rect">
             <a:avLst/>
@@ -4233,8 +4227,8 @@
         </p:blipFill>
         <p:spPr>
           <a:xfrm>
-            <a:off x="4394060" y="1753300"/>
-            <a:ext cx="2728171" cy="2757988"/>
+            <a:off x="2407642" y="298203"/>
+            <a:ext cx="6308498" cy="6377445"/>
           </a:xfrm>
           <a:prstGeom prst="rect">
             <a:avLst/>
@@ -4293,8 +4287,8 @@
         </p:blipFill>
         <p:spPr>
           <a:xfrm>
-            <a:off x="4469146" y="1886854"/>
-            <a:ext cx="2661496" cy="2647395"/>
+            <a:off x="2592200" y="322934"/>
+            <a:ext cx="6325298" cy="6291786"/>
           </a:xfrm>
           <a:prstGeom prst="rect">
             <a:avLst/>
@@ -4353,8 +4347,8 @@
         </p:blipFill>
         <p:spPr>
           <a:xfrm>
-            <a:off x="4510995" y="1903654"/>
-            <a:ext cx="2669982" cy="2655761"/>
+            <a:off x="2248250" y="198258"/>
+            <a:ext cx="6509858" cy="6475184"/>
           </a:xfrm>
           <a:prstGeom prst="rect">
             <a:avLst/>
@@ -4413,8 +4407,8 @@
         </p:blipFill>
         <p:spPr>
           <a:xfrm>
-            <a:off x="4725384" y="1930203"/>
-            <a:ext cx="2749208" cy="2738270"/>
+            <a:off x="2516697" y="306196"/>
+            <a:ext cx="6325299" cy="6300134"/>
           </a:xfrm>
           <a:prstGeom prst="rect">
             <a:avLst/>
@@ -4473,8 +4467,8 @@
         </p:blipFill>
         <p:spPr>
           <a:xfrm>
-            <a:off x="4505627" y="1683787"/>
-            <a:ext cx="2943798" cy="2959519"/>
+            <a:off x="2650921" y="365103"/>
+            <a:ext cx="6249798" cy="6283174"/>
           </a:xfrm>
           <a:prstGeom prst="rect">
             <a:avLst/>
@@ -4533,8 +4527,8 @@
         </p:blipFill>
         <p:spPr>
           <a:xfrm>
-            <a:off x="4454555" y="1757147"/>
-            <a:ext cx="3020036" cy="3011994"/>
+            <a:off x="2508308" y="506550"/>
+            <a:ext cx="5931017" cy="5915223"/>
           </a:xfrm>
           <a:prstGeom prst="rect">
             <a:avLst/>
@@ -4593,8 +4587,8 @@
         </p:blipFill>
         <p:spPr>
           <a:xfrm>
-            <a:off x="4496499" y="1837888"/>
-            <a:ext cx="2981588" cy="2981588"/>
+            <a:off x="2583809" y="353035"/>
+            <a:ext cx="6202961" cy="6202961"/>
           </a:xfrm>
           <a:prstGeom prst="rect">
             <a:avLst/>
@@ -4653,8 +4647,8 @@
         </p:blipFill>
         <p:spPr>
           <a:xfrm>
-            <a:off x="4421688" y="1702964"/>
-            <a:ext cx="3024898" cy="3041009"/>
+            <a:off x="2743200" y="445240"/>
+            <a:ext cx="5928179" cy="5959754"/>
           </a:xfrm>
           <a:prstGeom prst="rect">
             <a:avLst/>
@@ -4691,44 +4685,12 @@
           <a:chExt cx="0" cy="0"/>
         </a:xfrm>
       </p:grpSpPr>
-      <p:sp>
-        <p:nvSpPr>
-          <p:cNvPr id="2" name="Title 1">
-            <a:extLst>
-              <a:ext uri="{FF2B5EF4-FFF2-40B4-BE49-F238E27FC236}">
-                <a16:creationId xmlns:a16="http://schemas.microsoft.com/office/drawing/2014/main" id="{D36C892B-3FA1-4BD0-BB81-A4697FB438CF}"/>
-              </a:ext>
-            </a:extLst>
-          </p:cNvPr>
-          <p:cNvSpPr>
-            <a:spLocks noGrp="1"/>
-          </p:cNvSpPr>
-          <p:nvPr>
-            <p:ph type="ctrTitle"/>
-          </p:nvPr>
-        </p:nvSpPr>
-        <p:spPr>
-          <a:xfrm>
-            <a:off x="1524000" y="1122363"/>
-            <a:ext cx="9144000" cy="4456316"/>
-          </a:xfrm>
-        </p:spPr>
-        <p:txBody>
-          <a:bodyPr>
-            <a:normAutofit/>
-          </a:bodyPr>
-          <a:lstStyle/>
-          <a:p>
-            <a:endParaRPr lang="en-US" dirty="0"/>
-          </a:p>
-        </p:txBody>
-      </p:sp>
       <p:pic>
         <p:nvPicPr>
-          <p:cNvPr id="4" name="Picture 3">
-            <a:extLst>
-              <a:ext uri="{FF2B5EF4-FFF2-40B4-BE49-F238E27FC236}">
-                <a16:creationId xmlns:a16="http://schemas.microsoft.com/office/drawing/2014/main" id="{9B4D796A-778F-4252-BC14-FF027BB65980}"/>
+          <p:cNvPr id="3" name="Picture 2">
+            <a:extLst>
+              <a:ext uri="{FF2B5EF4-FFF2-40B4-BE49-F238E27FC236}">
+                <a16:creationId xmlns:a16="http://schemas.microsoft.com/office/drawing/2014/main" id="{8068F4A7-FC97-499E-91CA-8A10A05E9877}"/>
               </a:ext>
             </a:extLst>
           </p:cNvPr>
@@ -4738,21 +4700,15 @@
           <p:nvPr/>
         </p:nvPicPr>
         <p:blipFill>
-          <a:blip r:embed="rId2">
-            <a:extLst>
-              <a:ext uri="{28A0092B-C50C-407E-A947-70E740481C1C}">
-                <a14:useLocalDpi xmlns:a14="http://schemas.microsoft.com/office/drawing/2010/main" val="0"/>
-              </a:ext>
-            </a:extLst>
-          </a:blip>
+          <a:blip r:embed="rId2"/>
           <a:stretch>
             <a:fillRect/>
           </a:stretch>
         </p:blipFill>
         <p:spPr>
           <a:xfrm>
-            <a:off x="2509935" y="746449"/>
-            <a:ext cx="7003865" cy="5954019"/>
+            <a:off x="2801924" y="773102"/>
+            <a:ext cx="6172330" cy="5437068"/>
           </a:xfrm>
           <a:prstGeom prst="rect">
             <a:avLst/>
@@ -4811,8 +4767,8 @@
         </p:blipFill>
         <p:spPr>
           <a:xfrm>
-            <a:off x="4421688" y="1702964"/>
-            <a:ext cx="3024898" cy="3041009"/>
+            <a:off x="2634143" y="461750"/>
+            <a:ext cx="5978513" cy="6010356"/>
           </a:xfrm>
           <a:prstGeom prst="rect">
             <a:avLst/>
@@ -4849,44 +4805,12 @@
           <a:chExt cx="0" cy="0"/>
         </a:xfrm>
       </p:grpSpPr>
-      <p:sp>
-        <p:nvSpPr>
-          <p:cNvPr id="2" name="Title 1">
-            <a:extLst>
-              <a:ext uri="{FF2B5EF4-FFF2-40B4-BE49-F238E27FC236}">
-                <a16:creationId xmlns:a16="http://schemas.microsoft.com/office/drawing/2014/main" id="{D36C892B-3FA1-4BD0-BB81-A4697FB438CF}"/>
-              </a:ext>
-            </a:extLst>
-          </p:cNvPr>
-          <p:cNvSpPr>
-            <a:spLocks noGrp="1"/>
-          </p:cNvSpPr>
-          <p:nvPr>
-            <p:ph type="ctrTitle"/>
-          </p:nvPr>
-        </p:nvSpPr>
-        <p:spPr>
-          <a:xfrm>
-            <a:off x="1524000" y="1122363"/>
-            <a:ext cx="9144000" cy="4456316"/>
-          </a:xfrm>
-        </p:spPr>
-        <p:txBody>
-          <a:bodyPr>
-            <a:normAutofit/>
-          </a:bodyPr>
-          <a:lstStyle/>
-          <a:p>
-            <a:endParaRPr lang="en-US" dirty="0"/>
-          </a:p>
-        </p:txBody>
-      </p:sp>
       <p:pic>
         <p:nvPicPr>
-          <p:cNvPr id="4" name="Picture 3">
-            <a:extLst>
-              <a:ext uri="{FF2B5EF4-FFF2-40B4-BE49-F238E27FC236}">
-                <a16:creationId xmlns:a16="http://schemas.microsoft.com/office/drawing/2014/main" id="{D79C8482-3211-40FF-972B-0C6CEEB94D9D}"/>
+          <p:cNvPr id="3" name="Picture 2">
+            <a:extLst>
+              <a:ext uri="{FF2B5EF4-FFF2-40B4-BE49-F238E27FC236}">
+                <a16:creationId xmlns:a16="http://schemas.microsoft.com/office/drawing/2014/main" id="{CB288A5F-92DC-4CB7-8771-6F709675461C}"/>
               </a:ext>
             </a:extLst>
           </p:cNvPr>
@@ -4896,21 +4820,15 @@
           <p:nvPr/>
         </p:nvPicPr>
         <p:blipFill>
-          <a:blip r:embed="rId2">
-            <a:extLst>
-              <a:ext uri="{28A0092B-C50C-407E-A947-70E740481C1C}">
-                <a14:useLocalDpi xmlns:a14="http://schemas.microsoft.com/office/drawing/2010/main" val="0"/>
-              </a:ext>
-            </a:extLst>
-          </a:blip>
+          <a:blip r:embed="rId2"/>
           <a:stretch>
             <a:fillRect/>
           </a:stretch>
         </p:blipFill>
         <p:spPr>
           <a:xfrm>
-            <a:off x="2621902" y="587828"/>
-            <a:ext cx="7337579" cy="6198060"/>
+            <a:off x="2533475" y="584939"/>
+            <a:ext cx="6122435" cy="5660743"/>
           </a:xfrm>
           <a:prstGeom prst="rect">
             <a:avLst/>
@@ -4947,44 +4865,12 @@
           <a:chExt cx="0" cy="0"/>
         </a:xfrm>
       </p:grpSpPr>
-      <p:sp>
-        <p:nvSpPr>
-          <p:cNvPr id="2" name="Title 1">
-            <a:extLst>
-              <a:ext uri="{FF2B5EF4-FFF2-40B4-BE49-F238E27FC236}">
-                <a16:creationId xmlns:a16="http://schemas.microsoft.com/office/drawing/2014/main" id="{D36C892B-3FA1-4BD0-BB81-A4697FB438CF}"/>
-              </a:ext>
-            </a:extLst>
-          </p:cNvPr>
-          <p:cNvSpPr>
-            <a:spLocks noGrp="1"/>
-          </p:cNvSpPr>
-          <p:nvPr>
-            <p:ph type="ctrTitle"/>
-          </p:nvPr>
-        </p:nvSpPr>
-        <p:spPr>
-          <a:xfrm>
-            <a:off x="1524000" y="1122363"/>
-            <a:ext cx="9144000" cy="4456316"/>
-          </a:xfrm>
-        </p:spPr>
-        <p:txBody>
-          <a:bodyPr>
-            <a:normAutofit/>
-          </a:bodyPr>
-          <a:lstStyle/>
-          <a:p>
-            <a:endParaRPr lang="en-US" dirty="0"/>
-          </a:p>
-        </p:txBody>
-      </p:sp>
       <p:pic>
         <p:nvPicPr>
-          <p:cNvPr id="4" name="Picture 3">
-            <a:extLst>
-              <a:ext uri="{FF2B5EF4-FFF2-40B4-BE49-F238E27FC236}">
-                <a16:creationId xmlns:a16="http://schemas.microsoft.com/office/drawing/2014/main" id="{25C074C8-A4F6-4B85-AF98-DA097B6EFBC8}"/>
+          <p:cNvPr id="3" name="Picture 2">
+            <a:extLst>
+              <a:ext uri="{FF2B5EF4-FFF2-40B4-BE49-F238E27FC236}">
+                <a16:creationId xmlns:a16="http://schemas.microsoft.com/office/drawing/2014/main" id="{8FE0BC80-6A49-4ADE-98CB-20643A7DDCCF}"/>
               </a:ext>
             </a:extLst>
           </p:cNvPr>
@@ -4994,21 +4880,15 @@
           <p:nvPr/>
         </p:nvPicPr>
         <p:blipFill>
-          <a:blip r:embed="rId2">
-            <a:extLst>
-              <a:ext uri="{28A0092B-C50C-407E-A947-70E740481C1C}">
-                <a14:useLocalDpi xmlns:a14="http://schemas.microsoft.com/office/drawing/2010/main" val="0"/>
-              </a:ext>
-            </a:extLst>
-          </a:blip>
+          <a:blip r:embed="rId2"/>
           <a:stretch>
             <a:fillRect/>
           </a:stretch>
         </p:blipFill>
         <p:spPr>
           <a:xfrm>
-            <a:off x="2146319" y="459610"/>
-            <a:ext cx="7526136" cy="6398390"/>
+            <a:off x="2332140" y="420409"/>
+            <a:ext cx="6259627" cy="5624034"/>
           </a:xfrm>
           <a:prstGeom prst="rect">
             <a:avLst/>
@@ -5045,44 +4925,12 @@
           <a:chExt cx="0" cy="0"/>
         </a:xfrm>
       </p:grpSpPr>
-      <p:sp>
-        <p:nvSpPr>
-          <p:cNvPr id="2" name="Title 1">
-            <a:extLst>
-              <a:ext uri="{FF2B5EF4-FFF2-40B4-BE49-F238E27FC236}">
-                <a16:creationId xmlns:a16="http://schemas.microsoft.com/office/drawing/2014/main" id="{D36C892B-3FA1-4BD0-BB81-A4697FB438CF}"/>
-              </a:ext>
-            </a:extLst>
-          </p:cNvPr>
-          <p:cNvSpPr>
-            <a:spLocks noGrp="1"/>
-          </p:cNvSpPr>
-          <p:nvPr>
-            <p:ph type="ctrTitle"/>
-          </p:nvPr>
-        </p:nvSpPr>
-        <p:spPr>
-          <a:xfrm>
-            <a:off x="1524000" y="1122363"/>
-            <a:ext cx="9144000" cy="4456316"/>
-          </a:xfrm>
-        </p:spPr>
-        <p:txBody>
-          <a:bodyPr>
-            <a:normAutofit/>
-          </a:bodyPr>
-          <a:lstStyle/>
-          <a:p>
-            <a:endParaRPr lang="en-US" dirty="0"/>
-          </a:p>
-        </p:txBody>
-      </p:sp>
       <p:pic>
         <p:nvPicPr>
-          <p:cNvPr id="4" name="Picture 3">
-            <a:extLst>
-              <a:ext uri="{FF2B5EF4-FFF2-40B4-BE49-F238E27FC236}">
-                <a16:creationId xmlns:a16="http://schemas.microsoft.com/office/drawing/2014/main" id="{C512C9BD-B971-4E2B-B654-7716453F0220}"/>
+          <p:cNvPr id="3" name="Picture 2">
+            <a:extLst>
+              <a:ext uri="{FF2B5EF4-FFF2-40B4-BE49-F238E27FC236}">
+                <a16:creationId xmlns:a16="http://schemas.microsoft.com/office/drawing/2014/main" id="{300AC4A6-977C-4654-8506-5EC88919D2DF}"/>
               </a:ext>
             </a:extLst>
           </p:cNvPr>
@@ -5092,21 +4940,15 @@
           <p:nvPr/>
         </p:nvPicPr>
         <p:blipFill>
-          <a:blip r:embed="rId2">
-            <a:extLst>
-              <a:ext uri="{28A0092B-C50C-407E-A947-70E740481C1C}">
-                <a14:useLocalDpi xmlns:a14="http://schemas.microsoft.com/office/drawing/2010/main" val="0"/>
-              </a:ext>
-            </a:extLst>
-          </a:blip>
+          <a:blip r:embed="rId2"/>
           <a:stretch>
             <a:fillRect/>
           </a:stretch>
         </p:blipFill>
         <p:spPr>
           <a:xfrm>
-            <a:off x="2122498" y="341381"/>
-            <a:ext cx="7667084" cy="6516619"/>
+            <a:off x="2500988" y="721453"/>
+            <a:ext cx="6792529" cy="5580996"/>
           </a:xfrm>
           <a:prstGeom prst="rect">
             <a:avLst/>
@@ -5143,44 +4985,12 @@
           <a:chExt cx="0" cy="0"/>
         </a:xfrm>
       </p:grpSpPr>
-      <p:sp>
-        <p:nvSpPr>
-          <p:cNvPr id="2" name="Title 1">
-            <a:extLst>
-              <a:ext uri="{FF2B5EF4-FFF2-40B4-BE49-F238E27FC236}">
-                <a16:creationId xmlns:a16="http://schemas.microsoft.com/office/drawing/2014/main" id="{D36C892B-3FA1-4BD0-BB81-A4697FB438CF}"/>
-              </a:ext>
-            </a:extLst>
-          </p:cNvPr>
-          <p:cNvSpPr>
-            <a:spLocks noGrp="1"/>
-          </p:cNvSpPr>
-          <p:nvPr>
-            <p:ph type="ctrTitle"/>
-          </p:nvPr>
-        </p:nvSpPr>
-        <p:spPr>
-          <a:xfrm>
-            <a:off x="1524000" y="1122363"/>
-            <a:ext cx="9144000" cy="4456316"/>
-          </a:xfrm>
-        </p:spPr>
-        <p:txBody>
-          <a:bodyPr>
-            <a:normAutofit/>
-          </a:bodyPr>
-          <a:lstStyle/>
-          <a:p>
-            <a:endParaRPr lang="en-US" dirty="0"/>
-          </a:p>
-        </p:txBody>
-      </p:sp>
       <p:pic>
         <p:nvPicPr>
-          <p:cNvPr id="4" name="Picture 3">
-            <a:extLst>
-              <a:ext uri="{FF2B5EF4-FFF2-40B4-BE49-F238E27FC236}">
-                <a16:creationId xmlns:a16="http://schemas.microsoft.com/office/drawing/2014/main" id="{62911DF8-AF40-462B-BABE-80D5B6927FFE}"/>
+          <p:cNvPr id="3" name="Picture 2">
+            <a:extLst>
+              <a:ext uri="{FF2B5EF4-FFF2-40B4-BE49-F238E27FC236}">
+                <a16:creationId xmlns:a16="http://schemas.microsoft.com/office/drawing/2014/main" id="{53884E87-1437-4677-AC0E-883C6B841F2F}"/>
               </a:ext>
             </a:extLst>
           </p:cNvPr>
@@ -5190,21 +5000,15 @@
           <p:nvPr/>
         </p:nvPicPr>
         <p:blipFill>
-          <a:blip r:embed="rId2">
-            <a:extLst>
-              <a:ext uri="{28A0092B-C50C-407E-A947-70E740481C1C}">
-                <a14:useLocalDpi xmlns:a14="http://schemas.microsoft.com/office/drawing/2010/main" val="0"/>
-              </a:ext>
-            </a:extLst>
-          </a:blip>
+          <a:blip r:embed="rId2"/>
           <a:stretch>
             <a:fillRect/>
           </a:stretch>
         </p:blipFill>
         <p:spPr>
           <a:xfrm>
-            <a:off x="2041600" y="268153"/>
-            <a:ext cx="7884866" cy="6589847"/>
+            <a:off x="2525085" y="974043"/>
+            <a:ext cx="6237215" cy="5032299"/>
           </a:xfrm>
           <a:prstGeom prst="rect">
             <a:avLst/>
@@ -5241,44 +5045,12 @@
           <a:chExt cx="0" cy="0"/>
         </a:xfrm>
       </p:grpSpPr>
-      <p:sp>
-        <p:nvSpPr>
-          <p:cNvPr id="2" name="Title 1">
-            <a:extLst>
-              <a:ext uri="{FF2B5EF4-FFF2-40B4-BE49-F238E27FC236}">
-                <a16:creationId xmlns:a16="http://schemas.microsoft.com/office/drawing/2014/main" id="{D36C892B-3FA1-4BD0-BB81-A4697FB438CF}"/>
-              </a:ext>
-            </a:extLst>
-          </p:cNvPr>
-          <p:cNvSpPr>
-            <a:spLocks noGrp="1"/>
-          </p:cNvSpPr>
-          <p:nvPr>
-            <p:ph type="ctrTitle"/>
-          </p:nvPr>
-        </p:nvSpPr>
-        <p:spPr>
-          <a:xfrm>
-            <a:off x="1524000" y="1122363"/>
-            <a:ext cx="9144000" cy="4456316"/>
-          </a:xfrm>
-        </p:spPr>
-        <p:txBody>
-          <a:bodyPr>
-            <a:normAutofit/>
-          </a:bodyPr>
-          <a:lstStyle/>
-          <a:p>
-            <a:endParaRPr lang="en-US" dirty="0"/>
-          </a:p>
-        </p:txBody>
-      </p:sp>
       <p:pic>
         <p:nvPicPr>
-          <p:cNvPr id="4" name="Picture 3">
-            <a:extLst>
-              <a:ext uri="{FF2B5EF4-FFF2-40B4-BE49-F238E27FC236}">
-                <a16:creationId xmlns:a16="http://schemas.microsoft.com/office/drawing/2014/main" id="{4B633C4D-6B50-4425-8D4B-BA6607D8FA2C}"/>
+          <p:cNvPr id="3" name="Picture 2">
+            <a:extLst>
+              <a:ext uri="{FF2B5EF4-FFF2-40B4-BE49-F238E27FC236}">
+                <a16:creationId xmlns:a16="http://schemas.microsoft.com/office/drawing/2014/main" id="{38F842DD-6C48-418C-A336-F5AFCAEB350E}"/>
               </a:ext>
             </a:extLst>
           </p:cNvPr>
@@ -5288,21 +5060,15 @@
           <p:nvPr/>
         </p:nvPicPr>
         <p:blipFill>
-          <a:blip r:embed="rId2">
-            <a:extLst>
-              <a:ext uri="{28A0092B-C50C-407E-A947-70E740481C1C}">
-                <a14:useLocalDpi xmlns:a14="http://schemas.microsoft.com/office/drawing/2010/main" val="0"/>
-              </a:ext>
-            </a:extLst>
-          </a:blip>
+          <a:blip r:embed="rId2"/>
           <a:stretch>
             <a:fillRect/>
           </a:stretch>
         </p:blipFill>
         <p:spPr>
           <a:xfrm>
-            <a:off x="1866122" y="175842"/>
-            <a:ext cx="8036762" cy="6682158"/>
+            <a:off x="2617364" y="535880"/>
+            <a:ext cx="6387999" cy="5622863"/>
           </a:xfrm>
           <a:prstGeom prst="rect">
             <a:avLst/>
@@ -5367,8 +5133,8 @@
         </p:blipFill>
         <p:spPr>
           <a:xfrm>
-            <a:off x="4180116" y="1473125"/>
-            <a:ext cx="3666930" cy="3666930"/>
+            <a:off x="2290194" y="-30902"/>
+            <a:ext cx="6991370" cy="6991370"/>
           </a:xfrm>
           <a:prstGeom prst="rect">
             <a:avLst/>

</xml_diff>

<commit_message>
finish match tests 353, 354 to old UI
</commit_message>
<xml_diff>
--- a/web/media/ppt/timelineQRCode.pptx
+++ b/web/media/ppt/timelineQRCode.pptx
@@ -15,26 +15,26 @@
     <p:sldId id="273" r:id="rId9"/>
     <p:sldId id="272" r:id="rId10"/>
     <p:sldId id="269" r:id="rId11"/>
-    <p:sldId id="275" r:id="rId12"/>
-    <p:sldId id="276" r:id="rId13"/>
-    <p:sldId id="277" r:id="rId14"/>
-    <p:sldId id="278" r:id="rId15"/>
-    <p:sldId id="279" r:id="rId16"/>
-    <p:sldId id="280" r:id="rId17"/>
-    <p:sldId id="281" r:id="rId18"/>
-    <p:sldId id="282" r:id="rId19"/>
-    <p:sldId id="283" r:id="rId20"/>
-    <p:sldId id="284" r:id="rId21"/>
-    <p:sldId id="285" r:id="rId22"/>
-    <p:sldId id="286" r:id="rId23"/>
-    <p:sldId id="287" r:id="rId24"/>
-    <p:sldId id="288" r:id="rId25"/>
-    <p:sldId id="289" r:id="rId26"/>
-    <p:sldId id="290" r:id="rId27"/>
-    <p:sldId id="291" r:id="rId28"/>
-    <p:sldId id="292" r:id="rId29"/>
-    <p:sldId id="293" r:id="rId30"/>
-    <p:sldId id="294" r:id="rId31"/>
+    <p:sldId id="295" r:id="rId12"/>
+    <p:sldId id="275" r:id="rId13"/>
+    <p:sldId id="276" r:id="rId14"/>
+    <p:sldId id="277" r:id="rId15"/>
+    <p:sldId id="278" r:id="rId16"/>
+    <p:sldId id="279" r:id="rId17"/>
+    <p:sldId id="280" r:id="rId18"/>
+    <p:sldId id="281" r:id="rId19"/>
+    <p:sldId id="282" r:id="rId20"/>
+    <p:sldId id="283" r:id="rId21"/>
+    <p:sldId id="284" r:id="rId22"/>
+    <p:sldId id="285" r:id="rId23"/>
+    <p:sldId id="286" r:id="rId24"/>
+    <p:sldId id="287" r:id="rId25"/>
+    <p:sldId id="288" r:id="rId26"/>
+    <p:sldId id="289" r:id="rId27"/>
+    <p:sldId id="290" r:id="rId28"/>
+    <p:sldId id="291" r:id="rId29"/>
+    <p:sldId id="292" r:id="rId30"/>
+    <p:sldId id="293" r:id="rId31"/>
   </p:sldIdLst>
   <p:sldSz cx="12192000" cy="6858000"/>
   <p:notesSz cx="6858000" cy="9144000"/>
@@ -292,7 +292,7 @@
           <a:p>
             <a:fld id="{3ABE52FA-3C23-44BD-B501-603726A78153}" type="datetimeFigureOut">
               <a:rPr lang="en-US" smtClean="0"/>
-              <a:t>12-03-18</a:t>
+              <a:t>15-03-18</a:t>
             </a:fld>
             <a:endParaRPr lang="en-US"/>
           </a:p>
@@ -490,7 +490,7 @@
           <a:p>
             <a:fld id="{3ABE52FA-3C23-44BD-B501-603726A78153}" type="datetimeFigureOut">
               <a:rPr lang="en-US" smtClean="0"/>
-              <a:t>12-03-18</a:t>
+              <a:t>15-03-18</a:t>
             </a:fld>
             <a:endParaRPr lang="en-US"/>
           </a:p>
@@ -698,7 +698,7 @@
           <a:p>
             <a:fld id="{3ABE52FA-3C23-44BD-B501-603726A78153}" type="datetimeFigureOut">
               <a:rPr lang="en-US" smtClean="0"/>
-              <a:t>12-03-18</a:t>
+              <a:t>15-03-18</a:t>
             </a:fld>
             <a:endParaRPr lang="en-US"/>
           </a:p>
@@ -896,7 +896,7 @@
           <a:p>
             <a:fld id="{3ABE52FA-3C23-44BD-B501-603726A78153}" type="datetimeFigureOut">
               <a:rPr lang="en-US" smtClean="0"/>
-              <a:t>12-03-18</a:t>
+              <a:t>15-03-18</a:t>
             </a:fld>
             <a:endParaRPr lang="en-US"/>
           </a:p>
@@ -1171,7 +1171,7 @@
           <a:p>
             <a:fld id="{3ABE52FA-3C23-44BD-B501-603726A78153}" type="datetimeFigureOut">
               <a:rPr lang="en-US" smtClean="0"/>
-              <a:t>12-03-18</a:t>
+              <a:t>15-03-18</a:t>
             </a:fld>
             <a:endParaRPr lang="en-US"/>
           </a:p>
@@ -1436,7 +1436,7 @@
           <a:p>
             <a:fld id="{3ABE52FA-3C23-44BD-B501-603726A78153}" type="datetimeFigureOut">
               <a:rPr lang="en-US" smtClean="0"/>
-              <a:t>12-03-18</a:t>
+              <a:t>15-03-18</a:t>
             </a:fld>
             <a:endParaRPr lang="en-US"/>
           </a:p>
@@ -1848,7 +1848,7 @@
           <a:p>
             <a:fld id="{3ABE52FA-3C23-44BD-B501-603726A78153}" type="datetimeFigureOut">
               <a:rPr lang="en-US" smtClean="0"/>
-              <a:t>12-03-18</a:t>
+              <a:t>15-03-18</a:t>
             </a:fld>
             <a:endParaRPr lang="en-US"/>
           </a:p>
@@ -1989,7 +1989,7 @@
           <a:p>
             <a:fld id="{3ABE52FA-3C23-44BD-B501-603726A78153}" type="datetimeFigureOut">
               <a:rPr lang="en-US" smtClean="0"/>
-              <a:t>12-03-18</a:t>
+              <a:t>15-03-18</a:t>
             </a:fld>
             <a:endParaRPr lang="en-US"/>
           </a:p>
@@ -2102,7 +2102,7 @@
           <a:p>
             <a:fld id="{3ABE52FA-3C23-44BD-B501-603726A78153}" type="datetimeFigureOut">
               <a:rPr lang="en-US" smtClean="0"/>
-              <a:t>12-03-18</a:t>
+              <a:t>15-03-18</a:t>
             </a:fld>
             <a:endParaRPr lang="en-US"/>
           </a:p>
@@ -2413,7 +2413,7 @@
           <a:p>
             <a:fld id="{3ABE52FA-3C23-44BD-B501-603726A78153}" type="datetimeFigureOut">
               <a:rPr lang="en-US" smtClean="0"/>
-              <a:t>12-03-18</a:t>
+              <a:t>15-03-18</a:t>
             </a:fld>
             <a:endParaRPr lang="en-US"/>
           </a:p>
@@ -2701,7 +2701,7 @@
           <a:p>
             <a:fld id="{3ABE52FA-3C23-44BD-B501-603726A78153}" type="datetimeFigureOut">
               <a:rPr lang="en-US" smtClean="0"/>
-              <a:t>12-03-18</a:t>
+              <a:t>15-03-18</a:t>
             </a:fld>
             <a:endParaRPr lang="en-US"/>
           </a:p>
@@ -2942,7 +2942,7 @@
           <a:p>
             <a:fld id="{3ABE52FA-3C23-44BD-B501-603726A78153}" type="datetimeFigureOut">
               <a:rPr lang="en-US" smtClean="0"/>
-              <a:t>12-03-18</a:t>
+              <a:t>15-03-18</a:t>
             </a:fld>
             <a:endParaRPr lang="en-US"/>
           </a:p>
@@ -3487,6 +3487,66 @@
       </p:grpSpPr>
       <p:pic>
         <p:nvPicPr>
+          <p:cNvPr id="3" name="Picture 2">
+            <a:extLst>
+              <a:ext uri="{FF2B5EF4-FFF2-40B4-BE49-F238E27FC236}">
+                <a16:creationId xmlns:a16="http://schemas.microsoft.com/office/drawing/2014/main" id="{09333373-7D45-44B4-8357-F008C0D758EE}"/>
+              </a:ext>
+            </a:extLst>
+          </p:cNvPr>
+          <p:cNvPicPr>
+            <a:picLocks noChangeAspect="1"/>
+          </p:cNvPicPr>
+          <p:nvPr/>
+        </p:nvPicPr>
+        <p:blipFill>
+          <a:blip r:embed="rId2"/>
+          <a:stretch>
+            <a:fillRect/>
+          </a:stretch>
+        </p:blipFill>
+        <p:spPr>
+          <a:xfrm>
+            <a:off x="2794000" y="482600"/>
+            <a:ext cx="5994400" cy="5994400"/>
+          </a:xfrm>
+          <a:prstGeom prst="rect">
+            <a:avLst/>
+          </a:prstGeom>
+        </p:spPr>
+      </p:pic>
+    </p:spTree>
+    <p:extLst>
+      <p:ext uri="{BB962C8B-B14F-4D97-AF65-F5344CB8AC3E}">
+        <p14:creationId xmlns:p14="http://schemas.microsoft.com/office/powerpoint/2010/main" val="1481698255"/>
+      </p:ext>
+    </p:extLst>
+  </p:cSld>
+  <p:clrMapOvr>
+    <a:masterClrMapping/>
+  </p:clrMapOvr>
+</p:sld>
+</file>
+
+<file path=ppt/slides/slide12.xml><?xml version="1.0" encoding="utf-8"?>
+<p:sld xmlns:a="http://schemas.openxmlformats.org/drawingml/2006/main" xmlns:r="http://schemas.openxmlformats.org/officeDocument/2006/relationships" xmlns:p="http://schemas.openxmlformats.org/presentationml/2006/main">
+  <p:cSld>
+    <p:spTree>
+      <p:nvGrpSpPr>
+        <p:cNvPr id="1" name=""/>
+        <p:cNvGrpSpPr/>
+        <p:nvPr/>
+      </p:nvGrpSpPr>
+      <p:grpSpPr>
+        <a:xfrm>
+          <a:off x="0" y="0"/>
+          <a:ext cx="0" cy="0"/>
+          <a:chOff x="0" y="0"/>
+          <a:chExt cx="0" cy="0"/>
+        </a:xfrm>
+      </p:grpSpPr>
+      <p:pic>
+        <p:nvPicPr>
           <p:cNvPr id="4" name="Picture 3">
             <a:extLst>
               <a:ext uri="{FF2B5EF4-FFF2-40B4-BE49-F238E27FC236}">
@@ -3528,7 +3588,7 @@
 </p:sld>
 </file>
 
-<file path=ppt/slides/slide12.xml><?xml version="1.0" encoding="utf-8"?>
+<file path=ppt/slides/slide13.xml><?xml version="1.0" encoding="utf-8"?>
 <p:sld xmlns:a="http://schemas.openxmlformats.org/drawingml/2006/main" xmlns:r="http://schemas.openxmlformats.org/officeDocument/2006/relationships" xmlns:p="http://schemas.openxmlformats.org/presentationml/2006/main">
   <p:cSld>
     <p:spTree>
@@ -3588,7 +3648,7 @@
 </p:sld>
 </file>
 
-<file path=ppt/slides/slide13.xml><?xml version="1.0" encoding="utf-8"?>
+<file path=ppt/slides/slide14.xml><?xml version="1.0" encoding="utf-8"?>
 <p:sld xmlns:a="http://schemas.openxmlformats.org/drawingml/2006/main" xmlns:r="http://schemas.openxmlformats.org/officeDocument/2006/relationships" xmlns:p="http://schemas.openxmlformats.org/presentationml/2006/main">
   <p:cSld>
     <p:spTree>
@@ -3648,7 +3708,7 @@
 </p:sld>
 </file>
 
-<file path=ppt/slides/slide14.xml><?xml version="1.0" encoding="utf-8"?>
+<file path=ppt/slides/slide15.xml><?xml version="1.0" encoding="utf-8"?>
 <p:sld xmlns:a="http://schemas.openxmlformats.org/drawingml/2006/main" xmlns:r="http://schemas.openxmlformats.org/officeDocument/2006/relationships" xmlns:p="http://schemas.openxmlformats.org/presentationml/2006/main">
   <p:cSld>
     <p:spTree>
@@ -3708,7 +3768,7 @@
 </p:sld>
 </file>
 
-<file path=ppt/slides/slide15.xml><?xml version="1.0" encoding="utf-8"?>
+<file path=ppt/slides/slide16.xml><?xml version="1.0" encoding="utf-8"?>
 <p:sld xmlns:a="http://schemas.openxmlformats.org/drawingml/2006/main" xmlns:r="http://schemas.openxmlformats.org/officeDocument/2006/relationships" xmlns:p="http://schemas.openxmlformats.org/presentationml/2006/main">
   <p:cSld>
     <p:spTree>
@@ -3768,7 +3828,7 @@
 </p:sld>
 </file>
 
-<file path=ppt/slides/slide16.xml><?xml version="1.0" encoding="utf-8"?>
+<file path=ppt/slides/slide17.xml><?xml version="1.0" encoding="utf-8"?>
 <p:sld xmlns:a="http://schemas.openxmlformats.org/drawingml/2006/main" xmlns:r="http://schemas.openxmlformats.org/officeDocument/2006/relationships" xmlns:p="http://schemas.openxmlformats.org/presentationml/2006/main">
   <p:cSld>
     <p:spTree>
@@ -3828,7 +3888,7 @@
 </p:sld>
 </file>
 
-<file path=ppt/slides/slide17.xml><?xml version="1.0" encoding="utf-8"?>
+<file path=ppt/slides/slide18.xml><?xml version="1.0" encoding="utf-8"?>
 <p:sld xmlns:a="http://schemas.openxmlformats.org/drawingml/2006/main" xmlns:r="http://schemas.openxmlformats.org/officeDocument/2006/relationships" xmlns:p="http://schemas.openxmlformats.org/presentationml/2006/main">
   <p:cSld>
     <p:spTree>
@@ -3888,7 +3948,7 @@
 </p:sld>
 </file>
 
-<file path=ppt/slides/slide18.xml><?xml version="1.0" encoding="utf-8"?>
+<file path=ppt/slides/slide19.xml><?xml version="1.0" encoding="utf-8"?>
 <p:sld xmlns:a="http://schemas.openxmlformats.org/drawingml/2006/main" xmlns:r="http://schemas.openxmlformats.org/officeDocument/2006/relationships" xmlns:p="http://schemas.openxmlformats.org/presentationml/2006/main">
   <p:cSld>
     <p:spTree>
@@ -3939,66 +3999,6 @@
     <p:extLst>
       <p:ext uri="{BB962C8B-B14F-4D97-AF65-F5344CB8AC3E}">
         <p14:creationId xmlns:p14="http://schemas.microsoft.com/office/powerpoint/2010/main" val="649986408"/>
-      </p:ext>
-    </p:extLst>
-  </p:cSld>
-  <p:clrMapOvr>
-    <a:masterClrMapping/>
-  </p:clrMapOvr>
-</p:sld>
-</file>
-
-<file path=ppt/slides/slide19.xml><?xml version="1.0" encoding="utf-8"?>
-<p:sld xmlns:a="http://schemas.openxmlformats.org/drawingml/2006/main" xmlns:r="http://schemas.openxmlformats.org/officeDocument/2006/relationships" xmlns:p="http://schemas.openxmlformats.org/presentationml/2006/main">
-  <p:cSld>
-    <p:spTree>
-      <p:nvGrpSpPr>
-        <p:cNvPr id="1" name=""/>
-        <p:cNvGrpSpPr/>
-        <p:nvPr/>
-      </p:nvGrpSpPr>
-      <p:grpSpPr>
-        <a:xfrm>
-          <a:off x="0" y="0"/>
-          <a:ext cx="0" cy="0"/>
-          <a:chOff x="0" y="0"/>
-          <a:chExt cx="0" cy="0"/>
-        </a:xfrm>
-      </p:grpSpPr>
-      <p:pic>
-        <p:nvPicPr>
-          <p:cNvPr id="4" name="Picture 3">
-            <a:extLst>
-              <a:ext uri="{FF2B5EF4-FFF2-40B4-BE49-F238E27FC236}">
-                <a16:creationId xmlns:a16="http://schemas.microsoft.com/office/drawing/2014/main" id="{0F23656C-207E-4C95-8316-8F332735405F}"/>
-              </a:ext>
-            </a:extLst>
-          </p:cNvPr>
-          <p:cNvPicPr>
-            <a:picLocks noChangeAspect="1"/>
-          </p:cNvPicPr>
-          <p:nvPr/>
-        </p:nvPicPr>
-        <p:blipFill>
-          <a:blip r:embed="rId2"/>
-          <a:stretch>
-            <a:fillRect/>
-          </a:stretch>
-        </p:blipFill>
-        <p:spPr>
-          <a:xfrm>
-            <a:off x="2390863" y="247645"/>
-            <a:ext cx="6258186" cy="6283184"/>
-          </a:xfrm>
-          <a:prstGeom prst="rect">
-            <a:avLst/>
-          </a:prstGeom>
-        </p:spPr>
-      </p:pic>
-    </p:spTree>
-    <p:extLst>
-      <p:ext uri="{BB962C8B-B14F-4D97-AF65-F5344CB8AC3E}">
-        <p14:creationId xmlns:p14="http://schemas.microsoft.com/office/powerpoint/2010/main" val="3975928222"/>
       </p:ext>
     </p:extLst>
   </p:cSld>
@@ -4090,6 +4090,66 @@
           <p:cNvPr id="4" name="Picture 3">
             <a:extLst>
               <a:ext uri="{FF2B5EF4-FFF2-40B4-BE49-F238E27FC236}">
+                <a16:creationId xmlns:a16="http://schemas.microsoft.com/office/drawing/2014/main" id="{0F23656C-207E-4C95-8316-8F332735405F}"/>
+              </a:ext>
+            </a:extLst>
+          </p:cNvPr>
+          <p:cNvPicPr>
+            <a:picLocks noChangeAspect="1"/>
+          </p:cNvPicPr>
+          <p:nvPr/>
+        </p:nvPicPr>
+        <p:blipFill>
+          <a:blip r:embed="rId2"/>
+          <a:stretch>
+            <a:fillRect/>
+          </a:stretch>
+        </p:blipFill>
+        <p:spPr>
+          <a:xfrm>
+            <a:off x="2390863" y="247645"/>
+            <a:ext cx="6258186" cy="6283184"/>
+          </a:xfrm>
+          <a:prstGeom prst="rect">
+            <a:avLst/>
+          </a:prstGeom>
+        </p:spPr>
+      </p:pic>
+    </p:spTree>
+    <p:extLst>
+      <p:ext uri="{BB962C8B-B14F-4D97-AF65-F5344CB8AC3E}">
+        <p14:creationId xmlns:p14="http://schemas.microsoft.com/office/powerpoint/2010/main" val="3975928222"/>
+      </p:ext>
+    </p:extLst>
+  </p:cSld>
+  <p:clrMapOvr>
+    <a:masterClrMapping/>
+  </p:clrMapOvr>
+</p:sld>
+</file>
+
+<file path=ppt/slides/slide21.xml><?xml version="1.0" encoding="utf-8"?>
+<p:sld xmlns:a="http://schemas.openxmlformats.org/drawingml/2006/main" xmlns:r="http://schemas.openxmlformats.org/officeDocument/2006/relationships" xmlns:p="http://schemas.openxmlformats.org/presentationml/2006/main">
+  <p:cSld>
+    <p:spTree>
+      <p:nvGrpSpPr>
+        <p:cNvPr id="1" name=""/>
+        <p:cNvGrpSpPr/>
+        <p:nvPr/>
+      </p:nvGrpSpPr>
+      <p:grpSpPr>
+        <a:xfrm>
+          <a:off x="0" y="0"/>
+          <a:ext cx="0" cy="0"/>
+          <a:chOff x="0" y="0"/>
+          <a:chExt cx="0" cy="0"/>
+        </a:xfrm>
+      </p:grpSpPr>
+      <p:pic>
+        <p:nvPicPr>
+          <p:cNvPr id="4" name="Picture 3">
+            <a:extLst>
+              <a:ext uri="{FF2B5EF4-FFF2-40B4-BE49-F238E27FC236}">
                 <a16:creationId xmlns:a16="http://schemas.microsoft.com/office/drawing/2014/main" id="{24363600-039F-43C5-95EB-167DF4B49667}"/>
               </a:ext>
             </a:extLst>
@@ -4128,7 +4188,7 @@
 </p:sld>
 </file>
 
-<file path=ppt/slides/slide21.xml><?xml version="1.0" encoding="utf-8"?>
+<file path=ppt/slides/slide22.xml><?xml version="1.0" encoding="utf-8"?>
 <p:sld xmlns:a="http://schemas.openxmlformats.org/drawingml/2006/main" xmlns:r="http://schemas.openxmlformats.org/officeDocument/2006/relationships" xmlns:p="http://schemas.openxmlformats.org/presentationml/2006/main">
   <p:cSld>
     <p:spTree>
@@ -4188,7 +4248,7 @@
 </p:sld>
 </file>
 
-<file path=ppt/slides/slide22.xml><?xml version="1.0" encoding="utf-8"?>
+<file path=ppt/slides/slide23.xml><?xml version="1.0" encoding="utf-8"?>
 <p:sld xmlns:a="http://schemas.openxmlformats.org/drawingml/2006/main" xmlns:r="http://schemas.openxmlformats.org/officeDocument/2006/relationships" xmlns:p="http://schemas.openxmlformats.org/presentationml/2006/main">
   <p:cSld>
     <p:spTree>
@@ -4248,7 +4308,7 @@
 </p:sld>
 </file>
 
-<file path=ppt/slides/slide23.xml><?xml version="1.0" encoding="utf-8"?>
+<file path=ppt/slides/slide24.xml><?xml version="1.0" encoding="utf-8"?>
 <p:sld xmlns:a="http://schemas.openxmlformats.org/drawingml/2006/main" xmlns:r="http://schemas.openxmlformats.org/officeDocument/2006/relationships" xmlns:p="http://schemas.openxmlformats.org/presentationml/2006/main">
   <p:cSld>
     <p:spTree>
@@ -4308,7 +4368,7 @@
 </p:sld>
 </file>
 
-<file path=ppt/slides/slide24.xml><?xml version="1.0" encoding="utf-8"?>
+<file path=ppt/slides/slide25.xml><?xml version="1.0" encoding="utf-8"?>
 <p:sld xmlns:a="http://schemas.openxmlformats.org/drawingml/2006/main" xmlns:r="http://schemas.openxmlformats.org/officeDocument/2006/relationships" xmlns:p="http://schemas.openxmlformats.org/presentationml/2006/main">
   <p:cSld>
     <p:spTree>
@@ -4368,7 +4428,7 @@
 </p:sld>
 </file>
 
-<file path=ppt/slides/slide25.xml><?xml version="1.0" encoding="utf-8"?>
+<file path=ppt/slides/slide26.xml><?xml version="1.0" encoding="utf-8"?>
 <p:sld xmlns:a="http://schemas.openxmlformats.org/drawingml/2006/main" xmlns:r="http://schemas.openxmlformats.org/officeDocument/2006/relationships" xmlns:p="http://schemas.openxmlformats.org/presentationml/2006/main">
   <p:cSld>
     <p:spTree>
@@ -4428,7 +4488,7 @@
 </p:sld>
 </file>
 
-<file path=ppt/slides/slide26.xml><?xml version="1.0" encoding="utf-8"?>
+<file path=ppt/slides/slide27.xml><?xml version="1.0" encoding="utf-8"?>
 <p:sld xmlns:a="http://schemas.openxmlformats.org/drawingml/2006/main" xmlns:r="http://schemas.openxmlformats.org/officeDocument/2006/relationships" xmlns:p="http://schemas.openxmlformats.org/presentationml/2006/main">
   <p:cSld>
     <p:spTree>
@@ -4488,7 +4548,7 @@
 </p:sld>
 </file>
 
-<file path=ppt/slides/slide27.xml><?xml version="1.0" encoding="utf-8"?>
+<file path=ppt/slides/slide28.xml><?xml version="1.0" encoding="utf-8"?>
 <p:sld xmlns:a="http://schemas.openxmlformats.org/drawingml/2006/main" xmlns:r="http://schemas.openxmlformats.org/officeDocument/2006/relationships" xmlns:p="http://schemas.openxmlformats.org/presentationml/2006/main">
   <p:cSld>
     <p:spTree>
@@ -4548,7 +4608,7 @@
 </p:sld>
 </file>
 
-<file path=ppt/slides/slide28.xml><?xml version="1.0" encoding="utf-8"?>
+<file path=ppt/slides/slide29.xml><?xml version="1.0" encoding="utf-8"?>
 <p:sld xmlns:a="http://schemas.openxmlformats.org/drawingml/2006/main" xmlns:r="http://schemas.openxmlformats.org/officeDocument/2006/relationships" xmlns:p="http://schemas.openxmlformats.org/presentationml/2006/main">
   <p:cSld>
     <p:spTree>
@@ -4599,66 +4659,6 @@
     <p:extLst>
       <p:ext uri="{BB962C8B-B14F-4D97-AF65-F5344CB8AC3E}">
         <p14:creationId xmlns:p14="http://schemas.microsoft.com/office/powerpoint/2010/main" val="3835567959"/>
-      </p:ext>
-    </p:extLst>
-  </p:cSld>
-  <p:clrMapOvr>
-    <a:masterClrMapping/>
-  </p:clrMapOvr>
-</p:sld>
-</file>
-
-<file path=ppt/slides/slide29.xml><?xml version="1.0" encoding="utf-8"?>
-<p:sld xmlns:a="http://schemas.openxmlformats.org/drawingml/2006/main" xmlns:r="http://schemas.openxmlformats.org/officeDocument/2006/relationships" xmlns:p="http://schemas.openxmlformats.org/presentationml/2006/main">
-  <p:cSld>
-    <p:spTree>
-      <p:nvGrpSpPr>
-        <p:cNvPr id="1" name=""/>
-        <p:cNvGrpSpPr/>
-        <p:nvPr/>
-      </p:nvGrpSpPr>
-      <p:grpSpPr>
-        <a:xfrm>
-          <a:off x="0" y="0"/>
-          <a:ext cx="0" cy="0"/>
-          <a:chOff x="0" y="0"/>
-          <a:chExt cx="0" cy="0"/>
-        </a:xfrm>
-      </p:grpSpPr>
-      <p:pic>
-        <p:nvPicPr>
-          <p:cNvPr id="4" name="Picture 3">
-            <a:extLst>
-              <a:ext uri="{FF2B5EF4-FFF2-40B4-BE49-F238E27FC236}">
-                <a16:creationId xmlns:a16="http://schemas.microsoft.com/office/drawing/2014/main" id="{6CEE42C2-3928-4E2C-8B86-A1F18AD9077F}"/>
-              </a:ext>
-            </a:extLst>
-          </p:cNvPr>
-          <p:cNvPicPr>
-            <a:picLocks noChangeAspect="1"/>
-          </p:cNvPicPr>
-          <p:nvPr/>
-        </p:nvPicPr>
-        <p:blipFill>
-          <a:blip r:embed="rId2"/>
-          <a:stretch>
-            <a:fillRect/>
-          </a:stretch>
-        </p:blipFill>
-        <p:spPr>
-          <a:xfrm>
-            <a:off x="2743200" y="445240"/>
-            <a:ext cx="5928179" cy="5959754"/>
-          </a:xfrm>
-          <a:prstGeom prst="rect">
-            <a:avLst/>
-          </a:prstGeom>
-        </p:spPr>
-      </p:pic>
-    </p:spTree>
-    <p:extLst>
-      <p:ext uri="{BB962C8B-B14F-4D97-AF65-F5344CB8AC3E}">
-        <p14:creationId xmlns:p14="http://schemas.microsoft.com/office/powerpoint/2010/main" val="108913384"/>
       </p:ext>
     </p:extLst>
   </p:cSld>
@@ -4750,7 +4750,7 @@
           <p:cNvPr id="4" name="Picture 3">
             <a:extLst>
               <a:ext uri="{FF2B5EF4-FFF2-40B4-BE49-F238E27FC236}">
-                <a16:creationId xmlns:a16="http://schemas.microsoft.com/office/drawing/2014/main" id="{216EDB11-AACA-4CFA-B321-3972AD28C33E}"/>
+                <a16:creationId xmlns:a16="http://schemas.microsoft.com/office/drawing/2014/main" id="{6CEE42C2-3928-4E2C-8B86-A1F18AD9077F}"/>
               </a:ext>
             </a:extLst>
           </p:cNvPr>
@@ -4767,8 +4767,8 @@
         </p:blipFill>
         <p:spPr>
           <a:xfrm>
-            <a:off x="2634143" y="461750"/>
-            <a:ext cx="5978513" cy="6010356"/>
+            <a:off x="2743200" y="445240"/>
+            <a:ext cx="5928179" cy="5959754"/>
           </a:xfrm>
           <a:prstGeom prst="rect">
             <a:avLst/>
@@ -4778,7 +4778,7 @@
     </p:spTree>
     <p:extLst>
       <p:ext uri="{BB962C8B-B14F-4D97-AF65-F5344CB8AC3E}">
-        <p14:creationId xmlns:p14="http://schemas.microsoft.com/office/powerpoint/2010/main" val="2321157194"/>
+        <p14:creationId xmlns:p14="http://schemas.microsoft.com/office/powerpoint/2010/main" val="108913384"/>
       </p:ext>
     </p:extLst>
   </p:cSld>

</xml_diff>